<commit_message>
additional evaluation metrics, fix imports
</commit_message>
<xml_diff>
--- a/src/main/resources/nn.pptx
+++ b/src/main/resources/nn.pptx
@@ -5,10 +5,10 @@
     <p:sldMasterId id="2147483648" r:id="rId1"/>
   </p:sldMasterIdLst>
   <p:notesMasterIdLst>
-    <p:notesMasterId r:id="rId58"/>
+    <p:notesMasterId r:id="rId57"/>
   </p:notesMasterIdLst>
   <p:handoutMasterIdLst>
-    <p:handoutMasterId r:id="rId59"/>
+    <p:handoutMasterId r:id="rId58"/>
   </p:handoutMasterIdLst>
   <p:sldIdLst>
     <p:sldId id="271" r:id="rId2"/>
@@ -30,43 +30,42 @@
     <p:sldId id="380" r:id="rId18"/>
     <p:sldId id="387" r:id="rId19"/>
     <p:sldId id="378" r:id="rId20"/>
-    <p:sldId id="388" r:id="rId21"/>
-    <p:sldId id="389" r:id="rId22"/>
-    <p:sldId id="327" r:id="rId23"/>
-    <p:sldId id="329" r:id="rId24"/>
-    <p:sldId id="328" r:id="rId25"/>
-    <p:sldId id="331" r:id="rId26"/>
-    <p:sldId id="330" r:id="rId27"/>
-    <p:sldId id="333" r:id="rId28"/>
-    <p:sldId id="334" r:id="rId29"/>
-    <p:sldId id="335" r:id="rId30"/>
-    <p:sldId id="336" r:id="rId31"/>
-    <p:sldId id="339" r:id="rId32"/>
-    <p:sldId id="337" r:id="rId33"/>
-    <p:sldId id="354" r:id="rId34"/>
-    <p:sldId id="355" r:id="rId35"/>
-    <p:sldId id="356" r:id="rId36"/>
-    <p:sldId id="358" r:id="rId37"/>
-    <p:sldId id="360" r:id="rId38"/>
-    <p:sldId id="361" r:id="rId39"/>
-    <p:sldId id="362" r:id="rId40"/>
-    <p:sldId id="364" r:id="rId41"/>
-    <p:sldId id="344" r:id="rId42"/>
-    <p:sldId id="346" r:id="rId43"/>
-    <p:sldId id="366" r:id="rId44"/>
-    <p:sldId id="365" r:id="rId45"/>
-    <p:sldId id="341" r:id="rId46"/>
-    <p:sldId id="340" r:id="rId47"/>
-    <p:sldId id="369" r:id="rId48"/>
-    <p:sldId id="348" r:id="rId49"/>
-    <p:sldId id="370" r:id="rId50"/>
-    <p:sldId id="353" r:id="rId51"/>
-    <p:sldId id="372" r:id="rId52"/>
-    <p:sldId id="352" r:id="rId53"/>
-    <p:sldId id="347" r:id="rId54"/>
-    <p:sldId id="368" r:id="rId55"/>
-    <p:sldId id="367" r:id="rId56"/>
-    <p:sldId id="371" r:id="rId57"/>
+    <p:sldId id="389" r:id="rId21"/>
+    <p:sldId id="327" r:id="rId22"/>
+    <p:sldId id="329" r:id="rId23"/>
+    <p:sldId id="328" r:id="rId24"/>
+    <p:sldId id="331" r:id="rId25"/>
+    <p:sldId id="330" r:id="rId26"/>
+    <p:sldId id="333" r:id="rId27"/>
+    <p:sldId id="334" r:id="rId28"/>
+    <p:sldId id="335" r:id="rId29"/>
+    <p:sldId id="336" r:id="rId30"/>
+    <p:sldId id="339" r:id="rId31"/>
+    <p:sldId id="337" r:id="rId32"/>
+    <p:sldId id="354" r:id="rId33"/>
+    <p:sldId id="355" r:id="rId34"/>
+    <p:sldId id="356" r:id="rId35"/>
+    <p:sldId id="358" r:id="rId36"/>
+    <p:sldId id="360" r:id="rId37"/>
+    <p:sldId id="361" r:id="rId38"/>
+    <p:sldId id="362" r:id="rId39"/>
+    <p:sldId id="364" r:id="rId40"/>
+    <p:sldId id="344" r:id="rId41"/>
+    <p:sldId id="346" r:id="rId42"/>
+    <p:sldId id="366" r:id="rId43"/>
+    <p:sldId id="365" r:id="rId44"/>
+    <p:sldId id="341" r:id="rId45"/>
+    <p:sldId id="340" r:id="rId46"/>
+    <p:sldId id="369" r:id="rId47"/>
+    <p:sldId id="348" r:id="rId48"/>
+    <p:sldId id="370" r:id="rId49"/>
+    <p:sldId id="353" r:id="rId50"/>
+    <p:sldId id="372" r:id="rId51"/>
+    <p:sldId id="352" r:id="rId52"/>
+    <p:sldId id="347" r:id="rId53"/>
+    <p:sldId id="368" r:id="rId54"/>
+    <p:sldId id="367" r:id="rId55"/>
+    <p:sldId id="371" r:id="rId56"/>
   </p:sldIdLst>
   <p:sldSz cx="9144000" cy="6858000" type="screen4x3"/>
   <p:notesSz cx="6858000" cy="9144000"/>
@@ -223,7 +222,6 @@
             <p14:sldId id="380"/>
             <p14:sldId id="387"/>
             <p14:sldId id="378"/>
-            <p14:sldId id="388"/>
             <p14:sldId id="389"/>
             <p14:sldId id="327"/>
             <p14:sldId id="329"/>
@@ -294,10 +292,6 @@
 </p:cmAuthorLst>
 </file>
 
-<file path=ppt/revisionInfo.xml><?xml version="1.0" encoding="utf-8"?>
-<p1510:revInfo xmlns:a="http://schemas.openxmlformats.org/drawingml/2006/main" xmlns:r="http://schemas.openxmlformats.org/officeDocument/2006/relationships" xmlns:p1510="http://schemas.microsoft.com/office/powerpoint/2015/10/main"/>
-</file>
-
 <file path=ppt/handoutMasters/handoutMaster1.xml><?xml version="1.0" encoding="utf-8"?>
 <p:handoutMaster xmlns:a="http://schemas.openxmlformats.org/drawingml/2006/main" xmlns:r="http://schemas.openxmlformats.org/officeDocument/2006/relationships" xmlns:p="http://schemas.openxmlformats.org/presentationml/2006/main">
   <p:cSld>
@@ -407,7 +401,7 @@
               <a:pPr>
                 <a:defRPr/>
               </a:pPr>
-              <a:t>6/8/2018</a:t>
+              <a:t>5/30/19</a:t>
             </a:fld>
             <a:endParaRPr lang="en-US"/>
           </a:p>
@@ -627,7 +621,7 @@
               <a:pPr>
                 <a:defRPr/>
               </a:pPr>
-              <a:t>6/8/2018</a:t>
+              <a:t>5/30/19</a:t>
             </a:fld>
             <a:endParaRPr lang="en-US"/>
           </a:p>
@@ -1637,7 +1631,7 @@
     </p:spTree>
     <p:extLst>
       <p:ext uri="{BB962C8B-B14F-4D97-AF65-F5344CB8AC3E}">
-        <p14:creationId xmlns:p14="http://schemas.microsoft.com/office/powerpoint/2010/main" val="2862081802"/>
+        <p14:creationId xmlns:p14="http://schemas.microsoft.com/office/powerpoint/2010/main" val="4199838056"/>
       </p:ext>
     </p:extLst>
   </p:cSld>
@@ -1759,7 +1753,7 @@
     </p:spTree>
     <p:extLst>
       <p:ext uri="{BB962C8B-B14F-4D97-AF65-F5344CB8AC3E}">
-        <p14:creationId xmlns:p14="http://schemas.microsoft.com/office/powerpoint/2010/main" val="4199838056"/>
+        <p14:creationId xmlns:p14="http://schemas.microsoft.com/office/powerpoint/2010/main" val="1923953388"/>
       </p:ext>
     </p:extLst>
   </p:cSld>
@@ -1813,6 +1807,24 @@
           <a:bodyPr/>
           <a:lstStyle/>
           <a:p>
+            <a:r>
+              <a:rPr lang="en-US" dirty="0"/>
+              <a:t>When we</a:t>
+            </a:r>
+            <a:r>
+              <a:rPr lang="en-US" baseline="0" dirty="0"/>
+              <a:t> see an image of a pet, we are able to see a pattern.</a:t>
+            </a:r>
+          </a:p>
+          <a:p>
+            <a:r>
+              <a:rPr lang="en-US" dirty="0"/>
+              <a:t>We have seen</a:t>
+            </a:r>
+            <a:r>
+              <a:rPr lang="en-US" baseline="0" dirty="0"/>
+              <a:t> fair share of pets from an early age, knowledge gained by this experience formed our neural connections and so we are able to recognize a pet pattern.</a:t>
+            </a:r>
             <a:endParaRPr lang="hr-HR" dirty="0"/>
           </a:p>
         </p:txBody>
@@ -1820,7 +1832,7 @@
     </p:spTree>
     <p:extLst>
       <p:ext uri="{BB962C8B-B14F-4D97-AF65-F5344CB8AC3E}">
-        <p14:creationId xmlns:p14="http://schemas.microsoft.com/office/powerpoint/2010/main" val="1923953388"/>
+        <p14:creationId xmlns:p14="http://schemas.microsoft.com/office/powerpoint/2010/main" val="2433263102"/>
       </p:ext>
     </p:extLst>
   </p:cSld>
@@ -1876,21 +1888,17 @@
           <a:p>
             <a:r>
               <a:rPr lang="en-US" dirty="0"/>
-              <a:t>When we</a:t>
+              <a:t>Initially,</a:t>
             </a:r>
             <a:r>
               <a:rPr lang="en-US" baseline="0" dirty="0"/>
-              <a:t> see an image of a pet, we are able to see a pattern.</a:t>
-            </a:r>
-          </a:p>
-          <a:p>
-            <a:r>
-              <a:rPr lang="en-US" dirty="0"/>
-              <a:t>We have seen</a:t>
-            </a:r>
+              <a:t> small child might have a bunch of green toys, of which none is ‘pointy’. When it first encounters cacti, it might decide to play with it since it green, just like other toys, ignoring the pointy property al together.</a:t>
+            </a:r>
+          </a:p>
+          <a:p>
             <a:r>
               <a:rPr lang="en-US" baseline="0" dirty="0"/>
-              <a:t> fair share of pets from an early age, knowledge gained by this experience formed our neural connections and so we are able to recognize a pet pattern.</a:t>
+              <a:t>After a couple of painful experiences, the child learns that the color might not be so important for the future toys and that he should chose ones which are not pointy.</a:t>
             </a:r>
             <a:endParaRPr lang="hr-HR" dirty="0"/>
           </a:p>
@@ -1899,7 +1907,7 @@
     </p:spTree>
     <p:extLst>
       <p:ext uri="{BB962C8B-B14F-4D97-AF65-F5344CB8AC3E}">
-        <p14:creationId xmlns:p14="http://schemas.microsoft.com/office/powerpoint/2010/main" val="2433263102"/>
+        <p14:creationId xmlns:p14="http://schemas.microsoft.com/office/powerpoint/2010/main" val="2617474416"/>
       </p:ext>
     </p:extLst>
   </p:cSld>
@@ -1955,17 +1963,11 @@
           <a:p>
             <a:r>
               <a:rPr lang="en-US" dirty="0"/>
-              <a:t>Initially,</a:t>
+              <a:t>Neurons accumulate</a:t>
             </a:r>
             <a:r>
               <a:rPr lang="en-US" baseline="0" dirty="0"/>
-              <a:t> small child might have a bunch of green toys, of which none is ‘pointy’. When it first encounters cacti, it might decide to play with it since it green, just like other toys, ignoring the pointy property al together.</a:t>
-            </a:r>
-          </a:p>
-          <a:p>
-            <a:r>
-              <a:rPr lang="en-US" baseline="0" dirty="0"/>
-              <a:t>After a couple of painful experiences, the child learns that the color might not be so important for the future toys and that he should chose ones which are not pointy.</a:t>
+              <a:t> charge from other neurons continuously until the charge passes a threshold, this will cause neurons to activate.</a:t>
             </a:r>
             <a:endParaRPr lang="hr-HR" dirty="0"/>
           </a:p>
@@ -1974,7 +1976,7 @@
     </p:spTree>
     <p:extLst>
       <p:ext uri="{BB962C8B-B14F-4D97-AF65-F5344CB8AC3E}">
-        <p14:creationId xmlns:p14="http://schemas.microsoft.com/office/powerpoint/2010/main" val="2617474416"/>
+        <p14:creationId xmlns:p14="http://schemas.microsoft.com/office/powerpoint/2010/main" val="1036909889"/>
       </p:ext>
     </p:extLst>
   </p:cSld>
@@ -2028,14 +2030,6 @@
           <a:bodyPr/>
           <a:lstStyle/>
           <a:p>
-            <a:r>
-              <a:rPr lang="en-US" dirty="0"/>
-              <a:t>Neurons accumulate</a:t>
-            </a:r>
-            <a:r>
-              <a:rPr lang="en-US" baseline="0" dirty="0"/>
-              <a:t> charge from other neurons continuously until the charge passes a threshold, this will cause neurons to activate.</a:t>
-            </a:r>
             <a:endParaRPr lang="hr-HR" dirty="0"/>
           </a:p>
         </p:txBody>
@@ -2043,7 +2037,7 @@
     </p:spTree>
     <p:extLst>
       <p:ext uri="{BB962C8B-B14F-4D97-AF65-F5344CB8AC3E}">
-        <p14:creationId xmlns:p14="http://schemas.microsoft.com/office/powerpoint/2010/main" val="1036909889"/>
+        <p14:creationId xmlns:p14="http://schemas.microsoft.com/office/powerpoint/2010/main" val="2843035520"/>
       </p:ext>
     </p:extLst>
   </p:cSld>
@@ -2097,6 +2091,14 @@
           <a:bodyPr/>
           <a:lstStyle/>
           <a:p>
+            <a:r>
+              <a:rPr lang="en-US" dirty="0"/>
+              <a:t>If</a:t>
+            </a:r>
+            <a:r>
+              <a:rPr lang="en-US" baseline="0" dirty="0"/>
+              <a:t> the sum of neurons is say 5, and threshold is -2, we can simply replace threshold with always active X0 neuron with weight -2. The sum remains same, but we can dynamically adjust this weight -2.</a:t>
+            </a:r>
             <a:endParaRPr lang="hr-HR" dirty="0"/>
           </a:p>
         </p:txBody>
@@ -2104,7 +2106,7 @@
     </p:spTree>
     <p:extLst>
       <p:ext uri="{BB962C8B-B14F-4D97-AF65-F5344CB8AC3E}">
-        <p14:creationId xmlns:p14="http://schemas.microsoft.com/office/powerpoint/2010/main" val="2843035520"/>
+        <p14:creationId xmlns:p14="http://schemas.microsoft.com/office/powerpoint/2010/main" val="2796733879"/>
       </p:ext>
     </p:extLst>
   </p:cSld>
@@ -2159,21 +2161,16 @@
           <a:lstStyle/>
           <a:p>
             <a:r>
-              <a:rPr lang="en-US" dirty="0"/>
-              <a:t>If</a:t>
-            </a:r>
-            <a:r>
               <a:rPr lang="en-US" baseline="0" dirty="0"/>
-              <a:t> the sum of neurons is say 5, and threshold is -2, we can simply replace threshold with always active X0 neuron with weight -2. The sum remains same, but we can dynamically adjust this weight -2.</a:t>
-            </a:r>
-            <a:endParaRPr lang="hr-HR" dirty="0"/>
+              <a:t>Consider ELU and PRELU</a:t>
+            </a:r>
           </a:p>
         </p:txBody>
       </p:sp>
     </p:spTree>
     <p:extLst>
       <p:ext uri="{BB962C8B-B14F-4D97-AF65-F5344CB8AC3E}">
-        <p14:creationId xmlns:p14="http://schemas.microsoft.com/office/powerpoint/2010/main" val="2796733879"/>
+        <p14:creationId xmlns:p14="http://schemas.microsoft.com/office/powerpoint/2010/main" val="2056288039"/>
       </p:ext>
     </p:extLst>
   </p:cSld>
@@ -2227,17 +2224,14 @@
           <a:bodyPr/>
           <a:lstStyle/>
           <a:p>
-            <a:r>
-              <a:rPr lang="en-US" baseline="0" dirty="0"/>
-              <a:t>Consider ELU and PRELU</a:t>
-            </a:r>
+            <a:endParaRPr lang="hr-HR" dirty="0"/>
           </a:p>
         </p:txBody>
       </p:sp>
     </p:spTree>
     <p:extLst>
       <p:ext uri="{BB962C8B-B14F-4D97-AF65-F5344CB8AC3E}">
-        <p14:creationId xmlns:p14="http://schemas.microsoft.com/office/powerpoint/2010/main" val="2056288039"/>
+        <p14:creationId xmlns:p14="http://schemas.microsoft.com/office/powerpoint/2010/main" val="3477218919"/>
       </p:ext>
     </p:extLst>
   </p:cSld>
@@ -2298,7 +2292,7 @@
     </p:spTree>
     <p:extLst>
       <p:ext uri="{BB962C8B-B14F-4D97-AF65-F5344CB8AC3E}">
-        <p14:creationId xmlns:p14="http://schemas.microsoft.com/office/powerpoint/2010/main" val="3477218919"/>
+        <p14:creationId xmlns:p14="http://schemas.microsoft.com/office/powerpoint/2010/main" val="1456180756"/>
       </p:ext>
     </p:extLst>
   </p:cSld>
@@ -2359,7 +2353,7 @@
     </p:spTree>
     <p:extLst>
       <p:ext uri="{BB962C8B-B14F-4D97-AF65-F5344CB8AC3E}">
-        <p14:creationId xmlns:p14="http://schemas.microsoft.com/office/powerpoint/2010/main" val="1456180756"/>
+        <p14:creationId xmlns:p14="http://schemas.microsoft.com/office/powerpoint/2010/main" val="3204426231"/>
       </p:ext>
     </p:extLst>
   </p:cSld>
@@ -2481,7 +2475,7 @@
     </p:spTree>
     <p:extLst>
       <p:ext uri="{BB962C8B-B14F-4D97-AF65-F5344CB8AC3E}">
-        <p14:creationId xmlns:p14="http://schemas.microsoft.com/office/powerpoint/2010/main" val="3204426231"/>
+        <p14:creationId xmlns:p14="http://schemas.microsoft.com/office/powerpoint/2010/main" val="3724857274"/>
       </p:ext>
     </p:extLst>
   </p:cSld>
@@ -2542,7 +2536,7 @@
     </p:spTree>
     <p:extLst>
       <p:ext uri="{BB962C8B-B14F-4D97-AF65-F5344CB8AC3E}">
-        <p14:creationId xmlns:p14="http://schemas.microsoft.com/office/powerpoint/2010/main" val="3724857274"/>
+        <p14:creationId xmlns:p14="http://schemas.microsoft.com/office/powerpoint/2010/main" val="2372541462"/>
       </p:ext>
     </p:extLst>
   </p:cSld>
@@ -2603,7 +2597,7 @@
     </p:spTree>
     <p:extLst>
       <p:ext uri="{BB962C8B-B14F-4D97-AF65-F5344CB8AC3E}">
-        <p14:creationId xmlns:p14="http://schemas.microsoft.com/office/powerpoint/2010/main" val="2372541462"/>
+        <p14:creationId xmlns:p14="http://schemas.microsoft.com/office/powerpoint/2010/main" val="973504301"/>
       </p:ext>
     </p:extLst>
   </p:cSld>
@@ -2664,7 +2658,7 @@
     </p:spTree>
     <p:extLst>
       <p:ext uri="{BB962C8B-B14F-4D97-AF65-F5344CB8AC3E}">
-        <p14:creationId xmlns:p14="http://schemas.microsoft.com/office/powerpoint/2010/main" val="973504301"/>
+        <p14:creationId xmlns:p14="http://schemas.microsoft.com/office/powerpoint/2010/main" val="4270349681"/>
       </p:ext>
     </p:extLst>
   </p:cSld>
@@ -2725,7 +2719,7 @@
     </p:spTree>
     <p:extLst>
       <p:ext uri="{BB962C8B-B14F-4D97-AF65-F5344CB8AC3E}">
-        <p14:creationId xmlns:p14="http://schemas.microsoft.com/office/powerpoint/2010/main" val="4270349681"/>
+        <p14:creationId xmlns:p14="http://schemas.microsoft.com/office/powerpoint/2010/main" val="1661450298"/>
       </p:ext>
     </p:extLst>
   </p:cSld>
@@ -2786,7 +2780,7 @@
     </p:spTree>
     <p:extLst>
       <p:ext uri="{BB962C8B-B14F-4D97-AF65-F5344CB8AC3E}">
-        <p14:creationId xmlns:p14="http://schemas.microsoft.com/office/powerpoint/2010/main" val="1661450298"/>
+        <p14:creationId xmlns:p14="http://schemas.microsoft.com/office/powerpoint/2010/main" val="59482424"/>
       </p:ext>
     </p:extLst>
   </p:cSld>
@@ -2840,14 +2834,14 @@
           <a:bodyPr/>
           <a:lstStyle/>
           <a:p>
-            <a:endParaRPr lang="hr-HR" dirty="0"/>
+            <a:endParaRPr lang="en-US" dirty="0"/>
           </a:p>
         </p:txBody>
       </p:sp>
     </p:spTree>
     <p:extLst>
       <p:ext uri="{BB962C8B-B14F-4D97-AF65-F5344CB8AC3E}">
-        <p14:creationId xmlns:p14="http://schemas.microsoft.com/office/powerpoint/2010/main" val="59482424"/>
+        <p14:creationId xmlns:p14="http://schemas.microsoft.com/office/powerpoint/2010/main" val="4064727088"/>
       </p:ext>
     </p:extLst>
   </p:cSld>
@@ -2901,14 +2895,14 @@
           <a:bodyPr/>
           <a:lstStyle/>
           <a:p>
-            <a:endParaRPr lang="en-US" dirty="0"/>
+            <a:endParaRPr lang="hr-HR" dirty="0"/>
           </a:p>
         </p:txBody>
       </p:sp>
     </p:spTree>
     <p:extLst>
       <p:ext uri="{BB962C8B-B14F-4D97-AF65-F5344CB8AC3E}">
-        <p14:creationId xmlns:p14="http://schemas.microsoft.com/office/powerpoint/2010/main" val="4064727088"/>
+        <p14:creationId xmlns:p14="http://schemas.microsoft.com/office/powerpoint/2010/main" val="1724004156"/>
       </p:ext>
     </p:extLst>
   </p:cSld>
@@ -2969,7 +2963,7 @@
     </p:spTree>
     <p:extLst>
       <p:ext uri="{BB962C8B-B14F-4D97-AF65-F5344CB8AC3E}">
-        <p14:creationId xmlns:p14="http://schemas.microsoft.com/office/powerpoint/2010/main" val="1724004156"/>
+        <p14:creationId xmlns:p14="http://schemas.microsoft.com/office/powerpoint/2010/main" val="3073801589"/>
       </p:ext>
     </p:extLst>
   </p:cSld>
@@ -3030,7 +3024,7 @@
     </p:spTree>
     <p:extLst>
       <p:ext uri="{BB962C8B-B14F-4D97-AF65-F5344CB8AC3E}">
-        <p14:creationId xmlns:p14="http://schemas.microsoft.com/office/powerpoint/2010/main" val="3073801589"/>
+        <p14:creationId xmlns:p14="http://schemas.microsoft.com/office/powerpoint/2010/main" val="2809889704"/>
       </p:ext>
     </p:extLst>
   </p:cSld>
@@ -3152,7 +3146,7 @@
     </p:spTree>
     <p:extLst>
       <p:ext uri="{BB962C8B-B14F-4D97-AF65-F5344CB8AC3E}">
-        <p14:creationId xmlns:p14="http://schemas.microsoft.com/office/powerpoint/2010/main" val="2809889704"/>
+        <p14:creationId xmlns:p14="http://schemas.microsoft.com/office/powerpoint/2010/main" val="2638958660"/>
       </p:ext>
     </p:extLst>
   </p:cSld>
@@ -3213,7 +3207,7 @@
     </p:spTree>
     <p:extLst>
       <p:ext uri="{BB962C8B-B14F-4D97-AF65-F5344CB8AC3E}">
-        <p14:creationId xmlns:p14="http://schemas.microsoft.com/office/powerpoint/2010/main" val="2638958660"/>
+        <p14:creationId xmlns:p14="http://schemas.microsoft.com/office/powerpoint/2010/main" val="1305071474"/>
       </p:ext>
     </p:extLst>
   </p:cSld>
@@ -3267,14 +3261,22 @@
           <a:bodyPr/>
           <a:lstStyle/>
           <a:p>
-            <a:endParaRPr lang="hr-HR" dirty="0"/>
+            <a:endParaRPr lang="en-US" sz="1000" b="0" i="0" kern="1200" dirty="0">
+              <a:solidFill>
+                <a:schemeClr val="tx1"/>
+              </a:solidFill>
+              <a:effectLst/>
+              <a:latin typeface="+mn-lt"/>
+              <a:ea typeface="+mn-ea"/>
+              <a:cs typeface="+mn-cs"/>
+            </a:endParaRPr>
           </a:p>
         </p:txBody>
       </p:sp>
     </p:spTree>
     <p:extLst>
       <p:ext uri="{BB962C8B-B14F-4D97-AF65-F5344CB8AC3E}">
-        <p14:creationId xmlns:p14="http://schemas.microsoft.com/office/powerpoint/2010/main" val="1305071474"/>
+        <p14:creationId xmlns:p14="http://schemas.microsoft.com/office/powerpoint/2010/main" val="4017352246"/>
       </p:ext>
     </p:extLst>
   </p:cSld>
@@ -3328,22 +3330,31 @@
           <a:bodyPr/>
           <a:lstStyle/>
           <a:p>
-            <a:endParaRPr lang="en-US" sz="1000" b="0" i="0" kern="1200" dirty="0">
-              <a:solidFill>
-                <a:schemeClr val="tx1"/>
-              </a:solidFill>
-              <a:effectLst/>
-              <a:latin typeface="+mn-lt"/>
-              <a:ea typeface="+mn-ea"/>
-              <a:cs typeface="+mn-cs"/>
-            </a:endParaRPr>
+            <a:pPr marL="0" marR="0" lvl="0" indent="0" algn="l" defTabSz="777875" rtl="0" eaLnBrk="0" fontAlgn="base" latinLnBrk="0" hangingPunct="0">
+              <a:lnSpc>
+                <a:spcPct val="100000"/>
+              </a:lnSpc>
+              <a:spcBef>
+                <a:spcPct val="30000"/>
+              </a:spcBef>
+              <a:spcAft>
+                <a:spcPct val="0"/>
+              </a:spcAft>
+              <a:buClrTx/>
+              <a:buSzTx/>
+              <a:buFontTx/>
+              <a:buNone/>
+              <a:tabLst/>
+              <a:defRPr/>
+            </a:pPr>
+            <a:endParaRPr lang="hr-HR" dirty="0"/>
           </a:p>
         </p:txBody>
       </p:sp>
     </p:spTree>
     <p:extLst>
       <p:ext uri="{BB962C8B-B14F-4D97-AF65-F5344CB8AC3E}">
-        <p14:creationId xmlns:p14="http://schemas.microsoft.com/office/powerpoint/2010/main" val="4017352246"/>
+        <p14:creationId xmlns:p14="http://schemas.microsoft.com/office/powerpoint/2010/main" val="2961484045"/>
       </p:ext>
     </p:extLst>
   </p:cSld>
@@ -3397,23 +3408,42 @@
           <a:bodyPr/>
           <a:lstStyle/>
           <a:p>
-            <a:pPr marL="0" marR="0" lvl="0" indent="0" algn="l" defTabSz="777875" rtl="0" eaLnBrk="0" fontAlgn="base" latinLnBrk="0" hangingPunct="0">
-              <a:lnSpc>
-                <a:spcPct val="100000"/>
-              </a:lnSpc>
-              <a:spcBef>
-                <a:spcPct val="30000"/>
-              </a:spcBef>
-              <a:spcAft>
-                <a:spcPct val="0"/>
-              </a:spcAft>
-              <a:buClrTx/>
-              <a:buSzTx/>
-              <a:buFontTx/>
-              <a:buNone/>
-              <a:tabLst/>
-              <a:defRPr/>
-            </a:pPr>
+            <a:r>
+              <a:rPr lang="en-US" sz="1000" b="0" i="0" kern="1200" dirty="0">
+                <a:solidFill>
+                  <a:schemeClr val="tx1"/>
+                </a:solidFill>
+                <a:effectLst/>
+                <a:latin typeface="+mn-lt"/>
+                <a:ea typeface="+mn-ea"/>
+                <a:cs typeface="+mn-cs"/>
+              </a:rPr>
+              <a:t>The gradient at any location points in the direction of </a:t>
+            </a:r>
+            <a:r>
+              <a:rPr lang="en-US" sz="1000" b="1" i="0" kern="1200" dirty="0">
+                <a:solidFill>
+                  <a:schemeClr val="tx1"/>
+                </a:solidFill>
+                <a:effectLst/>
+                <a:latin typeface="+mn-lt"/>
+                <a:ea typeface="+mn-ea"/>
+                <a:cs typeface="+mn-cs"/>
+              </a:rPr>
+              <a:t>greatest increase</a:t>
+            </a:r>
+            <a:r>
+              <a:rPr lang="en-US" sz="1000" b="0" i="0" kern="1200" dirty="0">
+                <a:solidFill>
+                  <a:schemeClr val="tx1"/>
+                </a:solidFill>
+                <a:effectLst/>
+                <a:latin typeface="+mn-lt"/>
+                <a:ea typeface="+mn-ea"/>
+                <a:cs typeface="+mn-cs"/>
+              </a:rPr>
+              <a:t> of a function.  </a:t>
+            </a:r>
             <a:endParaRPr lang="hr-HR" dirty="0"/>
           </a:p>
         </p:txBody>
@@ -3421,7 +3451,7 @@
     </p:spTree>
     <p:extLst>
       <p:ext uri="{BB962C8B-B14F-4D97-AF65-F5344CB8AC3E}">
-        <p14:creationId xmlns:p14="http://schemas.microsoft.com/office/powerpoint/2010/main" val="2961484045"/>
+        <p14:creationId xmlns:p14="http://schemas.microsoft.com/office/powerpoint/2010/main" val="2654509603"/>
       </p:ext>
     </p:extLst>
   </p:cSld>
@@ -3475,42 +3505,6 @@
           <a:bodyPr/>
           <a:lstStyle/>
           <a:p>
-            <a:r>
-              <a:rPr lang="en-US" sz="1000" b="0" i="0" kern="1200" dirty="0">
-                <a:solidFill>
-                  <a:schemeClr val="tx1"/>
-                </a:solidFill>
-                <a:effectLst/>
-                <a:latin typeface="+mn-lt"/>
-                <a:ea typeface="+mn-ea"/>
-                <a:cs typeface="+mn-cs"/>
-              </a:rPr>
-              <a:t>The gradient at any location points in the direction of </a:t>
-            </a:r>
-            <a:r>
-              <a:rPr lang="en-US" sz="1000" b="1" i="0" kern="1200" dirty="0">
-                <a:solidFill>
-                  <a:schemeClr val="tx1"/>
-                </a:solidFill>
-                <a:effectLst/>
-                <a:latin typeface="+mn-lt"/>
-                <a:ea typeface="+mn-ea"/>
-                <a:cs typeface="+mn-cs"/>
-              </a:rPr>
-              <a:t>greatest increase</a:t>
-            </a:r>
-            <a:r>
-              <a:rPr lang="en-US" sz="1000" b="0" i="0" kern="1200" dirty="0">
-                <a:solidFill>
-                  <a:schemeClr val="tx1"/>
-                </a:solidFill>
-                <a:effectLst/>
-                <a:latin typeface="+mn-lt"/>
-                <a:ea typeface="+mn-ea"/>
-                <a:cs typeface="+mn-cs"/>
-              </a:rPr>
-              <a:t> of a function.  </a:t>
-            </a:r>
             <a:endParaRPr lang="hr-HR" dirty="0"/>
           </a:p>
         </p:txBody>
@@ -3518,7 +3512,7 @@
     </p:spTree>
     <p:extLst>
       <p:ext uri="{BB962C8B-B14F-4D97-AF65-F5344CB8AC3E}">
-        <p14:creationId xmlns:p14="http://schemas.microsoft.com/office/powerpoint/2010/main" val="2654509603"/>
+        <p14:creationId xmlns:p14="http://schemas.microsoft.com/office/powerpoint/2010/main" val="1701097455"/>
       </p:ext>
     </p:extLst>
   </p:cSld>
@@ -3579,7 +3573,7 @@
     </p:spTree>
     <p:extLst>
       <p:ext uri="{BB962C8B-B14F-4D97-AF65-F5344CB8AC3E}">
-        <p14:creationId xmlns:p14="http://schemas.microsoft.com/office/powerpoint/2010/main" val="1701097455"/>
+        <p14:creationId xmlns:p14="http://schemas.microsoft.com/office/powerpoint/2010/main" val="2488180712"/>
       </p:ext>
     </p:extLst>
   </p:cSld>
@@ -3633,6 +3627,23 @@
           <a:bodyPr/>
           <a:lstStyle/>
           <a:p>
+            <a:pPr marL="0" marR="0" lvl="0" indent="0" algn="l" defTabSz="777875" rtl="0" eaLnBrk="0" fontAlgn="base" latinLnBrk="0" hangingPunct="0">
+              <a:lnSpc>
+                <a:spcPct val="100000"/>
+              </a:lnSpc>
+              <a:spcBef>
+                <a:spcPct val="30000"/>
+              </a:spcBef>
+              <a:spcAft>
+                <a:spcPct val="0"/>
+              </a:spcAft>
+              <a:buClrTx/>
+              <a:buSzTx/>
+              <a:buFontTx/>
+              <a:buNone/>
+              <a:tabLst/>
+              <a:defRPr/>
+            </a:pPr>
             <a:endParaRPr lang="hr-HR" dirty="0"/>
           </a:p>
         </p:txBody>
@@ -3640,7 +3651,7 @@
     </p:spTree>
     <p:extLst>
       <p:ext uri="{BB962C8B-B14F-4D97-AF65-F5344CB8AC3E}">
-        <p14:creationId xmlns:p14="http://schemas.microsoft.com/office/powerpoint/2010/main" val="2488180712"/>
+        <p14:creationId xmlns:p14="http://schemas.microsoft.com/office/powerpoint/2010/main" val="4120606570"/>
       </p:ext>
     </p:extLst>
   </p:cSld>
@@ -3718,7 +3729,7 @@
     </p:spTree>
     <p:extLst>
       <p:ext uri="{BB962C8B-B14F-4D97-AF65-F5344CB8AC3E}">
-        <p14:creationId xmlns:p14="http://schemas.microsoft.com/office/powerpoint/2010/main" val="4120606570"/>
+        <p14:creationId xmlns:p14="http://schemas.microsoft.com/office/powerpoint/2010/main" val="2303629728"/>
       </p:ext>
     </p:extLst>
   </p:cSld>
@@ -3769,7 +3780,9 @@
         </p:nvSpPr>
         <p:spPr/>
         <p:txBody>
-          <a:bodyPr/>
+          <a:bodyPr>
+            <a:normAutofit/>
+          </a:bodyPr>
           <a:lstStyle/>
           <a:p>
             <a:pPr marL="0" marR="0" lvl="0" indent="0" algn="l" defTabSz="777875" rtl="0" eaLnBrk="0" fontAlgn="base" latinLnBrk="0" hangingPunct="0">
@@ -3796,7 +3809,7 @@
     </p:spTree>
     <p:extLst>
       <p:ext uri="{BB962C8B-B14F-4D97-AF65-F5344CB8AC3E}">
-        <p14:creationId xmlns:p14="http://schemas.microsoft.com/office/powerpoint/2010/main" val="2303629728"/>
+        <p14:creationId xmlns:p14="http://schemas.microsoft.com/office/powerpoint/2010/main" val="461251805"/>
       </p:ext>
     </p:extLst>
   </p:cSld>
@@ -3908,28 +3921,9 @@
         </p:nvSpPr>
         <p:spPr/>
         <p:txBody>
-          <a:bodyPr>
-            <a:normAutofit/>
-          </a:bodyPr>
+          <a:bodyPr/>
           <a:lstStyle/>
           <a:p>
-            <a:pPr marL="0" marR="0" lvl="0" indent="0" algn="l" defTabSz="777875" rtl="0" eaLnBrk="0" fontAlgn="base" latinLnBrk="0" hangingPunct="0">
-              <a:lnSpc>
-                <a:spcPct val="100000"/>
-              </a:lnSpc>
-              <a:spcBef>
-                <a:spcPct val="30000"/>
-              </a:spcBef>
-              <a:spcAft>
-                <a:spcPct val="0"/>
-              </a:spcAft>
-              <a:buClrTx/>
-              <a:buSzTx/>
-              <a:buFontTx/>
-              <a:buNone/>
-              <a:tabLst/>
-              <a:defRPr/>
-            </a:pPr>
             <a:endParaRPr lang="hr-HR" dirty="0"/>
           </a:p>
         </p:txBody>
@@ -3937,7 +3931,7 @@
     </p:spTree>
     <p:extLst>
       <p:ext uri="{BB962C8B-B14F-4D97-AF65-F5344CB8AC3E}">
-        <p14:creationId xmlns:p14="http://schemas.microsoft.com/office/powerpoint/2010/main" val="461251805"/>
+        <p14:creationId xmlns:p14="http://schemas.microsoft.com/office/powerpoint/2010/main" val="467874003"/>
       </p:ext>
     </p:extLst>
   </p:cSld>
@@ -3998,7 +3992,7 @@
     </p:spTree>
     <p:extLst>
       <p:ext uri="{BB962C8B-B14F-4D97-AF65-F5344CB8AC3E}">
-        <p14:creationId xmlns:p14="http://schemas.microsoft.com/office/powerpoint/2010/main" val="467874003"/>
+        <p14:creationId xmlns:p14="http://schemas.microsoft.com/office/powerpoint/2010/main" val="1502465416"/>
       </p:ext>
     </p:extLst>
   </p:cSld>
@@ -4059,7 +4053,7 @@
     </p:spTree>
     <p:extLst>
       <p:ext uri="{BB962C8B-B14F-4D97-AF65-F5344CB8AC3E}">
-        <p14:creationId xmlns:p14="http://schemas.microsoft.com/office/powerpoint/2010/main" val="1502465416"/>
+        <p14:creationId xmlns:p14="http://schemas.microsoft.com/office/powerpoint/2010/main" val="1167325578"/>
       </p:ext>
     </p:extLst>
   </p:cSld>
@@ -4070,67 +4064,6 @@
 </file>
 
 <file path=ppt/notesSlides/notesSlide53.xml><?xml version="1.0" encoding="utf-8"?>
-<p:notes xmlns:a="http://schemas.openxmlformats.org/drawingml/2006/main" xmlns:r="http://schemas.openxmlformats.org/officeDocument/2006/relationships" xmlns:p="http://schemas.openxmlformats.org/presentationml/2006/main">
-  <p:cSld>
-    <p:spTree>
-      <p:nvGrpSpPr>
-        <p:cNvPr id="1" name=""/>
-        <p:cNvGrpSpPr/>
-        <p:nvPr/>
-      </p:nvGrpSpPr>
-      <p:grpSpPr>
-        <a:xfrm>
-          <a:off x="0" y="0"/>
-          <a:ext cx="0" cy="0"/>
-          <a:chOff x="0" y="0"/>
-          <a:chExt cx="0" cy="0"/>
-        </a:xfrm>
-      </p:grpSpPr>
-      <p:sp>
-        <p:nvSpPr>
-          <p:cNvPr id="2" name="Slide Image Placeholder 1"/>
-          <p:cNvSpPr>
-            <a:spLocks noGrp="1" noRot="1" noChangeAspect="1"/>
-          </p:cNvSpPr>
-          <p:nvPr>
-            <p:ph type="sldImg"/>
-          </p:nvPr>
-        </p:nvSpPr>
-        <p:spPr/>
-      </p:sp>
-      <p:sp>
-        <p:nvSpPr>
-          <p:cNvPr id="3" name="Notes Placeholder 2"/>
-          <p:cNvSpPr>
-            <a:spLocks noGrp="1"/>
-          </p:cNvSpPr>
-          <p:nvPr>
-            <p:ph type="body" idx="1"/>
-          </p:nvPr>
-        </p:nvSpPr>
-        <p:spPr/>
-        <p:txBody>
-          <a:bodyPr/>
-          <a:lstStyle/>
-          <a:p>
-            <a:endParaRPr lang="hr-HR" dirty="0"/>
-          </a:p>
-        </p:txBody>
-      </p:sp>
-    </p:spTree>
-    <p:extLst>
-      <p:ext uri="{BB962C8B-B14F-4D97-AF65-F5344CB8AC3E}">
-        <p14:creationId xmlns:p14="http://schemas.microsoft.com/office/powerpoint/2010/main" val="1167325578"/>
-      </p:ext>
-    </p:extLst>
-  </p:cSld>
-  <p:clrMapOvr>
-    <a:masterClrMapping/>
-  </p:clrMapOvr>
-</p:notes>
-</file>
-
-<file path=ppt/notesSlides/notesSlide54.xml><?xml version="1.0" encoding="utf-8"?>
 <p:notes xmlns:a="http://schemas.openxmlformats.org/drawingml/2006/main" xmlns:r="http://schemas.openxmlformats.org/officeDocument/2006/relationships" xmlns:p="http://schemas.openxmlformats.org/presentationml/2006/main">
   <p:cSld>
     <p:spTree>
@@ -4657,7 +4590,7 @@
               <a:pPr>
                 <a:defRPr/>
               </a:pPr>
-              <a:t>Friday, June 8, 2018</a:t>
+              <a:t>Thursday, May 30, 2019</a:t>
             </a:fld>
             <a:endParaRPr lang="en-US"/>
           </a:p>
@@ -4850,7 +4783,7 @@
               <a:pPr>
                 <a:defRPr/>
               </a:pPr>
-              <a:t>Friday, June 8, 2018</a:t>
+              <a:t>Thursday, May 30, 2019</a:t>
             </a:fld>
             <a:endParaRPr lang="en-US"/>
           </a:p>
@@ -5053,7 +4986,7 @@
               <a:pPr>
                 <a:defRPr/>
               </a:pPr>
-              <a:t>Friday, June 8, 2018</a:t>
+              <a:t>Thursday, May 30, 2019</a:t>
             </a:fld>
             <a:endParaRPr lang="en-US"/>
           </a:p>
@@ -5246,7 +5179,7 @@
               <a:pPr>
                 <a:defRPr/>
               </a:pPr>
-              <a:t>Friday, June 8, 2018</a:t>
+              <a:t>Thursday, May 30, 2019</a:t>
             </a:fld>
             <a:endParaRPr lang="en-US"/>
           </a:p>
@@ -5516,7 +5449,7 @@
               <a:pPr>
                 <a:defRPr/>
               </a:pPr>
-              <a:t>Friday, June 8, 2018</a:t>
+              <a:t>Thursday, May 30, 2019</a:t>
             </a:fld>
             <a:endParaRPr lang="en-US"/>
           </a:p>
@@ -5826,7 +5759,7 @@
               <a:pPr>
                 <a:defRPr/>
               </a:pPr>
-              <a:t>Friday, June 8, 2018</a:t>
+              <a:t>Thursday, May 30, 2019</a:t>
             </a:fld>
             <a:endParaRPr lang="en-US"/>
           </a:p>
@@ -6270,7 +6203,7 @@
               <a:pPr>
                 <a:defRPr/>
               </a:pPr>
-              <a:t>Friday, June 8, 2018</a:t>
+              <a:t>Thursday, May 30, 2019</a:t>
             </a:fld>
             <a:endParaRPr lang="en-US"/>
           </a:p>
@@ -6412,7 +6345,7 @@
               <a:pPr>
                 <a:defRPr/>
               </a:pPr>
-              <a:t>Friday, June 8, 2018</a:t>
+              <a:t>Thursday, May 30, 2019</a:t>
             </a:fld>
             <a:endParaRPr lang="en-US"/>
           </a:p>
@@ -6532,7 +6465,7 @@
               <a:pPr>
                 <a:defRPr/>
               </a:pPr>
-              <a:t>Friday, June 8, 2018</a:t>
+              <a:t>Thursday, May 30, 2019</a:t>
             </a:fld>
             <a:endParaRPr lang="en-US"/>
           </a:p>
@@ -6832,7 +6765,7 @@
               <a:pPr>
                 <a:defRPr/>
               </a:pPr>
-              <a:t>Friday, June 8, 2018</a:t>
+              <a:t>Thursday, May 30, 2019</a:t>
             </a:fld>
             <a:endParaRPr lang="en-US"/>
           </a:p>
@@ -7112,7 +7045,7 @@
               <a:pPr>
                 <a:defRPr/>
               </a:pPr>
-              <a:t>Friday, June 8, 2018</a:t>
+              <a:t>Thursday, May 30, 2019</a:t>
             </a:fld>
             <a:endParaRPr lang="en-US"/>
           </a:p>
@@ -7378,7 +7311,7 @@
               <a:pPr>
                 <a:defRPr/>
               </a:pPr>
-              <a:t>Friday, June 8, 2018</a:t>
+              <a:t>Thursday, May 30, 2019</a:t>
             </a:fld>
             <a:endParaRPr lang="en-US"/>
           </a:p>
@@ -15099,191 +15032,6 @@
       </p:grpSpPr>
       <p:sp>
         <p:nvSpPr>
-          <p:cNvPr id="2" name="Title 1"/>
-          <p:cNvSpPr>
-            <a:spLocks noGrp="1"/>
-          </p:cNvSpPr>
-          <p:nvPr>
-            <p:ph type="title"/>
-          </p:nvPr>
-        </p:nvSpPr>
-        <p:spPr/>
-        <p:txBody>
-          <a:bodyPr/>
-          <a:lstStyle/>
-          <a:p>
-            <a:r>
-              <a:rPr lang="en-US" dirty="0"/>
-              <a:t>Alternative solutions</a:t>
-            </a:r>
-          </a:p>
-        </p:txBody>
-      </p:sp>
-      <p:sp>
-        <p:nvSpPr>
-          <p:cNvPr id="3" name="Content Placeholder 2"/>
-          <p:cNvSpPr>
-            <a:spLocks noGrp="1"/>
-          </p:cNvSpPr>
-          <p:nvPr>
-            <p:ph idx="1"/>
-          </p:nvPr>
-        </p:nvSpPr>
-        <p:spPr>
-          <a:xfrm>
-            <a:off x="457200" y="1600200"/>
-            <a:ext cx="8229600" cy="4781128"/>
-          </a:xfrm>
-        </p:spPr>
-        <p:txBody>
-          <a:bodyPr/>
-          <a:lstStyle/>
-          <a:p>
-            <a:r>
-              <a:rPr lang="en-US" dirty="0"/>
-              <a:t>Naïve Bayes is a linear classifier and therefore will give poor results for </a:t>
-            </a:r>
-            <a:r>
-              <a:rPr lang="en-US" i="1" dirty="0"/>
-              <a:t>non-linearly separable </a:t>
-            </a:r>
-            <a:r>
-              <a:rPr lang="en-US" dirty="0"/>
-              <a:t>problems</a:t>
-            </a:r>
-          </a:p>
-          <a:p>
-            <a:pPr lvl="1">
-              <a:buFont typeface="Arial" panose="020B0604020202020204" pitchFamily="34" charset="0"/>
-              <a:buChar char="•"/>
-            </a:pPr>
-            <a:r>
-              <a:rPr lang="en-US" dirty="0"/>
-              <a:t>stay tuned for </a:t>
-            </a:r>
-            <a:r>
-              <a:rPr lang="en-US" b="1" dirty="0"/>
-              <a:t>linearly separable </a:t>
-            </a:r>
-            <a:r>
-              <a:rPr lang="en-US" dirty="0"/>
-              <a:t>problems</a:t>
-            </a:r>
-          </a:p>
-          <a:p>
-            <a:pPr lvl="1">
-              <a:buFont typeface="Arial" panose="020B0604020202020204" pitchFamily="34" charset="0"/>
-              <a:buChar char="•"/>
-            </a:pPr>
-            <a:r>
-              <a:rPr lang="en-US" dirty="0"/>
-              <a:t>text classification is largely linearly separable problem, although we cannot prove this</a:t>
-            </a:r>
-          </a:p>
-          <a:p>
-            <a:pPr>
-              <a:buFont typeface="Arial" panose="020B0604020202020204" pitchFamily="34" charset="0"/>
-              <a:buChar char="•"/>
-            </a:pPr>
-            <a:r>
-              <a:rPr lang="en-US" dirty="0"/>
-              <a:t>Fast and easy to implement, gives really good results</a:t>
-            </a:r>
-          </a:p>
-          <a:p>
-            <a:pPr>
-              <a:buFont typeface="Arial" panose="020B0604020202020204" pitchFamily="34" charset="0"/>
-              <a:buChar char="•"/>
-            </a:pPr>
-            <a:r>
-              <a:rPr lang="en-US" b="1" dirty="0"/>
-              <a:t>Generative</a:t>
-            </a:r>
-            <a:r>
-              <a:rPr lang="en-US" dirty="0"/>
-              <a:t> model </a:t>
-            </a:r>
-          </a:p>
-          <a:p>
-            <a:pPr>
-              <a:buFont typeface="Arial" panose="020B0604020202020204" pitchFamily="34" charset="0"/>
-              <a:buChar char="•"/>
-            </a:pPr>
-            <a:r>
-              <a:rPr lang="en-US" dirty="0"/>
-              <a:t>For non-linearly separable problems consider Random forest, KNN,</a:t>
-            </a:r>
-            <a:r>
-              <a:rPr lang="en-US" b="1" dirty="0"/>
-              <a:t> </a:t>
-            </a:r>
-            <a:r>
-              <a:rPr lang="en-US" dirty="0"/>
-              <a:t>SVM and </a:t>
-            </a:r>
-            <a:r>
-              <a:rPr lang="en-US" b="1" dirty="0"/>
-              <a:t>Neural networks</a:t>
-            </a:r>
-            <a:endParaRPr lang="en-US" dirty="0"/>
-          </a:p>
-          <a:p>
-            <a:pPr lvl="1"/>
-            <a:r>
-              <a:rPr lang="en-US" dirty="0"/>
-              <a:t>by the order of headache these will give you </a:t>
-            </a:r>
-            <a:r>
-              <a:rPr lang="en-US" dirty="0">
-                <a:sym typeface="Wingdings" panose="05000000000000000000" pitchFamily="2" charset="2"/>
-              </a:rPr>
-              <a:t></a:t>
-            </a:r>
-            <a:endParaRPr lang="en-US" dirty="0"/>
-          </a:p>
-          <a:p>
-            <a:endParaRPr lang="en-US" dirty="0"/>
-          </a:p>
-          <a:p>
-            <a:endParaRPr lang="en-US" dirty="0"/>
-          </a:p>
-        </p:txBody>
-      </p:sp>
-    </p:spTree>
-    <p:extLst>
-      <p:ext uri="{BB962C8B-B14F-4D97-AF65-F5344CB8AC3E}">
-        <p14:creationId xmlns:p14="http://schemas.microsoft.com/office/powerpoint/2010/main" val="2872328556"/>
-      </p:ext>
-    </p:extLst>
-  </p:cSld>
-  <p:clrMapOvr>
-    <a:masterClrMapping/>
-  </p:clrMapOvr>
-  <p:transition>
-    <p:fade thruBlk="1"/>
-  </p:transition>
-</p:sld>
-</file>
-
-<file path=ppt/slides/slide21.xml><?xml version="1.0" encoding="utf-8"?>
-<p:sld xmlns:a="http://schemas.openxmlformats.org/drawingml/2006/main" xmlns:r="http://schemas.openxmlformats.org/officeDocument/2006/relationships" xmlns:p="http://schemas.openxmlformats.org/presentationml/2006/main">
-  <p:cSld>
-    <p:spTree>
-      <p:nvGrpSpPr>
-        <p:cNvPr id="1" name=""/>
-        <p:cNvGrpSpPr/>
-        <p:nvPr/>
-      </p:nvGrpSpPr>
-      <p:grpSpPr>
-        <a:xfrm>
-          <a:off x="0" y="0"/>
-          <a:ext cx="0" cy="0"/>
-          <a:chOff x="0" y="0"/>
-          <a:chExt cx="0" cy="0"/>
-        </a:xfrm>
-      </p:grpSpPr>
-      <p:sp>
-        <p:nvSpPr>
           <p:cNvPr id="5" name="Title 4"/>
           <p:cNvSpPr>
             <a:spLocks noGrp="1"/>
@@ -15341,7 +15089,7 @@
 </p:sld>
 </file>
 
-<file path=ppt/slides/slide22.xml><?xml version="1.0" encoding="utf-8"?>
+<file path=ppt/slides/slide21.xml><?xml version="1.0" encoding="utf-8"?>
 <p:sld xmlns:a="http://schemas.openxmlformats.org/drawingml/2006/main" xmlns:r="http://schemas.openxmlformats.org/officeDocument/2006/relationships" xmlns:p="http://schemas.openxmlformats.org/presentationml/2006/main">
   <p:cSld>
     <p:spTree>
@@ -15469,7 +15217,7 @@
 </p:sld>
 </file>
 
-<file path=ppt/slides/slide23.xml><?xml version="1.0" encoding="utf-8"?>
+<file path=ppt/slides/slide22.xml><?xml version="1.0" encoding="utf-8"?>
 <p:sld xmlns:a="http://schemas.openxmlformats.org/drawingml/2006/main" xmlns:r="http://schemas.openxmlformats.org/officeDocument/2006/relationships" xmlns:p="http://schemas.openxmlformats.org/presentationml/2006/main">
   <p:cSld>
     <p:spTree>
@@ -15593,7 +15341,7 @@
 </p:sld>
 </file>
 
-<file path=ppt/slides/slide24.xml><?xml version="1.0" encoding="utf-8"?>
+<file path=ppt/slides/slide23.xml><?xml version="1.0" encoding="utf-8"?>
 <p:sld xmlns:a="http://schemas.openxmlformats.org/drawingml/2006/main" xmlns:r="http://schemas.openxmlformats.org/officeDocument/2006/relationships" xmlns:p="http://schemas.openxmlformats.org/presentationml/2006/main">
   <p:cSld>
     <p:spTree>
@@ -15978,7 +15726,7 @@
 </p:sld>
 </file>
 
-<file path=ppt/slides/slide25.xml><?xml version="1.0" encoding="utf-8"?>
+<file path=ppt/slides/slide24.xml><?xml version="1.0" encoding="utf-8"?>
 <p:sld xmlns:a="http://schemas.openxmlformats.org/drawingml/2006/main" xmlns:r="http://schemas.openxmlformats.org/officeDocument/2006/relationships" xmlns:p="http://schemas.openxmlformats.org/presentationml/2006/main">
   <p:cSld>
     <p:spTree>
@@ -16062,7 +15810,7 @@
 </p:sld>
 </file>
 
-<file path=ppt/slides/slide26.xml><?xml version="1.0" encoding="utf-8"?>
+<file path=ppt/slides/slide25.xml><?xml version="1.0" encoding="utf-8"?>
 <p:sld xmlns:a="http://schemas.openxmlformats.org/drawingml/2006/main" xmlns:r="http://schemas.openxmlformats.org/officeDocument/2006/relationships" xmlns:p="http://schemas.openxmlformats.org/presentationml/2006/main">
   <p:cSld>
     <p:spTree>
@@ -16248,7 +15996,7 @@
 </p:sld>
 </file>
 
-<file path=ppt/slides/slide27.xml><?xml version="1.0" encoding="utf-8"?>
+<file path=ppt/slides/slide26.xml><?xml version="1.0" encoding="utf-8"?>
 <p:sld xmlns:a="http://schemas.openxmlformats.org/drawingml/2006/main" xmlns:r="http://schemas.openxmlformats.org/officeDocument/2006/relationships" xmlns:p="http://schemas.openxmlformats.org/presentationml/2006/main">
   <p:cSld>
     <p:spTree>
@@ -16595,7 +16343,7 @@
 </p:sld>
 </file>
 
-<file path=ppt/slides/slide28.xml><?xml version="1.0" encoding="utf-8"?>
+<file path=ppt/slides/slide27.xml><?xml version="1.0" encoding="utf-8"?>
 <p:sld xmlns:a="http://schemas.openxmlformats.org/drawingml/2006/main" xmlns:r="http://schemas.openxmlformats.org/officeDocument/2006/relationships" xmlns:p="http://schemas.openxmlformats.org/presentationml/2006/main">
   <p:cSld>
     <p:spTree>
@@ -16801,7 +16549,7 @@
 </p:sld>
 </file>
 
-<file path=ppt/slides/slide29.xml><?xml version="1.0" encoding="utf-8"?>
+<file path=ppt/slides/slide28.xml><?xml version="1.0" encoding="utf-8"?>
 <p:sld xmlns:a="http://schemas.openxmlformats.org/drawingml/2006/main" xmlns:r="http://schemas.openxmlformats.org/officeDocument/2006/relationships" xmlns:p="http://schemas.openxmlformats.org/presentationml/2006/main">
   <p:cSld>
     <p:spTree>
@@ -17161,6 +16909,263 @@
 </p:sld>
 </file>
 
+<file path=ppt/slides/slide29.xml><?xml version="1.0" encoding="utf-8"?>
+<p:sld xmlns:a="http://schemas.openxmlformats.org/drawingml/2006/main" xmlns:r="http://schemas.openxmlformats.org/officeDocument/2006/relationships" xmlns:p="http://schemas.openxmlformats.org/presentationml/2006/main">
+  <p:cSld>
+    <p:spTree>
+      <p:nvGrpSpPr>
+        <p:cNvPr id="1" name=""/>
+        <p:cNvGrpSpPr/>
+        <p:nvPr/>
+      </p:nvGrpSpPr>
+      <p:grpSpPr>
+        <a:xfrm>
+          <a:off x="0" y="0"/>
+          <a:ext cx="0" cy="0"/>
+          <a:chOff x="0" y="0"/>
+          <a:chExt cx="0" cy="0"/>
+        </a:xfrm>
+      </p:grpSpPr>
+      <p:sp>
+        <p:nvSpPr>
+          <p:cNvPr id="2" name="Title 1"/>
+          <p:cNvSpPr>
+            <a:spLocks noGrp="1"/>
+          </p:cNvSpPr>
+          <p:nvPr>
+            <p:ph type="title"/>
+          </p:nvPr>
+        </p:nvSpPr>
+        <p:spPr/>
+        <p:txBody>
+          <a:bodyPr/>
+          <a:lstStyle/>
+          <a:p>
+            <a:r>
+              <a:rPr lang="en-US" dirty="0"/>
+              <a:t>Learning – adjusting weights </a:t>
+            </a:r>
+          </a:p>
+        </p:txBody>
+      </p:sp>
+      <p:sp>
+        <p:nvSpPr>
+          <p:cNvPr id="3" name="Content Placeholder 2"/>
+          <p:cNvSpPr>
+            <a:spLocks noGrp="1"/>
+          </p:cNvSpPr>
+          <p:nvPr>
+            <p:ph idx="1"/>
+          </p:nvPr>
+        </p:nvSpPr>
+        <p:spPr>
+          <a:xfrm>
+            <a:off x="457200" y="1600200"/>
+            <a:ext cx="8229600" cy="4781128"/>
+          </a:xfrm>
+        </p:spPr>
+        <p:txBody>
+          <a:bodyPr/>
+          <a:lstStyle/>
+          <a:p>
+            <a:pPr>
+              <a:buFont typeface="Arial" panose="020B0604020202020204" pitchFamily="34" charset="0"/>
+              <a:buChar char="•"/>
+            </a:pPr>
+            <a:r>
+              <a:rPr lang="en-US" dirty="0"/>
+              <a:t>Adjust weights until some stopping criteria is met</a:t>
+            </a:r>
+          </a:p>
+          <a:p>
+            <a:pPr>
+              <a:buFont typeface="Arial" panose="020B0604020202020204" pitchFamily="34" charset="0"/>
+              <a:buChar char="•"/>
+            </a:pPr>
+            <a:r>
+              <a:rPr lang="en-US" dirty="0"/>
+              <a:t>Weight update is calculated from previous weight</a:t>
+            </a:r>
+          </a:p>
+          <a:p>
+            <a:pPr lvl="1">
+              <a:buFont typeface="Arial" panose="020B0604020202020204" pitchFamily="34" charset="0"/>
+              <a:buChar char="•"/>
+            </a:pPr>
+            <a:r>
+              <a:rPr lang="en-US" dirty="0" err="1"/>
+              <a:t>Wk</a:t>
+            </a:r>
+            <a:r>
+              <a:rPr lang="en-US" dirty="0"/>
+              <a:t>(n+1) = </a:t>
+            </a:r>
+            <a:r>
+              <a:rPr lang="en-US" dirty="0" err="1"/>
+              <a:t>Wk</a:t>
+            </a:r>
+            <a:r>
+              <a:rPr lang="en-US" dirty="0"/>
+              <a:t>(n) + </a:t>
+            </a:r>
+            <a:r>
+              <a:rPr lang="el-GR" dirty="0">
+                <a:latin typeface="times new roman" panose="02020603050405020304" pitchFamily="18" charset="0"/>
+              </a:rPr>
+              <a:t>Δ</a:t>
+            </a:r>
+            <a:r>
+              <a:rPr lang="en-US" dirty="0">
+                <a:latin typeface="times new roman" panose="02020603050405020304" pitchFamily="18" charset="0"/>
+              </a:rPr>
+              <a:t> </a:t>
+            </a:r>
+            <a:r>
+              <a:rPr lang="en-US" dirty="0" err="1"/>
+              <a:t>Wk</a:t>
+            </a:r>
+            <a:r>
+              <a:rPr lang="en-US" dirty="0"/>
+              <a:t>(n)</a:t>
+            </a:r>
+          </a:p>
+          <a:p>
+            <a:pPr lvl="1">
+              <a:buFont typeface="Arial" panose="020B0604020202020204" pitchFamily="34" charset="0"/>
+              <a:buChar char="•"/>
+            </a:pPr>
+            <a:r>
+              <a:rPr lang="en-US" dirty="0"/>
+              <a:t>Learning algorithms differ in calculation of </a:t>
+            </a:r>
+            <a:r>
+              <a:rPr lang="el-GR" b="1" dirty="0">
+                <a:solidFill>
+                  <a:srgbClr val="000000"/>
+                </a:solidFill>
+                <a:latin typeface="times new roman" panose="02020603050405020304" pitchFamily="18" charset="0"/>
+              </a:rPr>
+              <a:t>Δ</a:t>
+            </a:r>
+            <a:r>
+              <a:rPr lang="en-US" b="1" dirty="0">
+                <a:solidFill>
+                  <a:srgbClr val="000000"/>
+                </a:solidFill>
+                <a:latin typeface="times new roman" panose="02020603050405020304" pitchFamily="18" charset="0"/>
+              </a:rPr>
+              <a:t> </a:t>
+            </a:r>
+            <a:r>
+              <a:rPr lang="en-US" b="1" dirty="0" err="1">
+                <a:solidFill>
+                  <a:srgbClr val="000000"/>
+                </a:solidFill>
+              </a:rPr>
+              <a:t>Wk</a:t>
+            </a:r>
+            <a:r>
+              <a:rPr lang="en-US" b="1" dirty="0">
+                <a:solidFill>
+                  <a:srgbClr val="000000"/>
+                </a:solidFill>
+              </a:rPr>
+              <a:t>(n)</a:t>
+            </a:r>
+          </a:p>
+          <a:p>
+            <a:pPr>
+              <a:buFont typeface="Arial" panose="020B0604020202020204" pitchFamily="34" charset="0"/>
+              <a:buChar char="•"/>
+            </a:pPr>
+            <a:r>
+              <a:rPr lang="en-US" dirty="0"/>
+              <a:t>There isn’t a single best learning algorithm</a:t>
+            </a:r>
+          </a:p>
+          <a:p>
+            <a:pPr>
+              <a:buFont typeface="Arial" panose="020B0604020202020204" pitchFamily="34" charset="0"/>
+              <a:buChar char="•"/>
+            </a:pPr>
+            <a:r>
+              <a:rPr lang="en-US" dirty="0"/>
+              <a:t>Learning paradigms:</a:t>
+            </a:r>
+          </a:p>
+          <a:p>
+            <a:pPr lvl="1">
+              <a:buFont typeface="Arial" panose="020B0604020202020204" pitchFamily="34" charset="0"/>
+              <a:buChar char="•"/>
+            </a:pPr>
+            <a:r>
+              <a:rPr lang="en-US" b="1" dirty="0"/>
+              <a:t>supervised</a:t>
+            </a:r>
+          </a:p>
+          <a:p>
+            <a:pPr lvl="1">
+              <a:buFont typeface="Arial" panose="020B0604020202020204" pitchFamily="34" charset="0"/>
+              <a:buChar char="•"/>
+            </a:pPr>
+            <a:r>
+              <a:rPr lang="en-US" dirty="0"/>
+              <a:t>unsupervised</a:t>
+            </a:r>
+          </a:p>
+          <a:p>
+            <a:pPr lvl="1">
+              <a:buFont typeface="Arial" panose="020B0604020202020204" pitchFamily="34" charset="0"/>
+              <a:buChar char="•"/>
+            </a:pPr>
+            <a:r>
+              <a:rPr lang="en-US" dirty="0"/>
+              <a:t>reinforced</a:t>
+            </a:r>
+          </a:p>
+          <a:p>
+            <a:pPr lvl="1">
+              <a:buFont typeface="Arial" panose="020B0604020202020204" pitchFamily="34" charset="0"/>
+              <a:buChar char="•"/>
+            </a:pPr>
+            <a:endParaRPr lang="en-US" dirty="0"/>
+          </a:p>
+          <a:p>
+            <a:pPr>
+              <a:buFont typeface="Arial" panose="020B0604020202020204" pitchFamily="34" charset="0"/>
+              <a:buChar char="•"/>
+            </a:pPr>
+            <a:endParaRPr lang="en-US" dirty="0">
+              <a:solidFill>
+                <a:srgbClr val="000000"/>
+              </a:solidFill>
+            </a:endParaRPr>
+          </a:p>
+          <a:p>
+            <a:pPr>
+              <a:buFont typeface="Arial" panose="020B0604020202020204" pitchFamily="34" charset="0"/>
+              <a:buChar char="•"/>
+            </a:pPr>
+            <a:endParaRPr lang="en-US" dirty="0"/>
+          </a:p>
+        </p:txBody>
+      </p:sp>
+    </p:spTree>
+    <p:extLst>
+      <p:ext uri="{BB962C8B-B14F-4D97-AF65-F5344CB8AC3E}">
+        <p14:creationId xmlns:p14="http://schemas.microsoft.com/office/powerpoint/2010/main" val="1187519242"/>
+      </p:ext>
+    </p:extLst>
+  </p:cSld>
+  <p:clrMapOvr>
+    <a:masterClrMapping/>
+  </p:clrMapOvr>
+  <p:transition>
+    <p:fade thruBlk="1"/>
+  </p:transition>
+</p:sld>
+</file>
+
 <file path=ppt/slides/slide3.xml><?xml version="1.0" encoding="utf-8"?>
 <p:sld xmlns:a="http://schemas.openxmlformats.org/drawingml/2006/main" xmlns:r="http://schemas.openxmlformats.org/officeDocument/2006/relationships" xmlns:p="http://schemas.openxmlformats.org/presentationml/2006/main">
   <p:cSld>
@@ -17277,263 +17282,6 @@
 </file>
 
 <file path=ppt/slides/slide30.xml><?xml version="1.0" encoding="utf-8"?>
-<p:sld xmlns:a="http://schemas.openxmlformats.org/drawingml/2006/main" xmlns:r="http://schemas.openxmlformats.org/officeDocument/2006/relationships" xmlns:p="http://schemas.openxmlformats.org/presentationml/2006/main">
-  <p:cSld>
-    <p:spTree>
-      <p:nvGrpSpPr>
-        <p:cNvPr id="1" name=""/>
-        <p:cNvGrpSpPr/>
-        <p:nvPr/>
-      </p:nvGrpSpPr>
-      <p:grpSpPr>
-        <a:xfrm>
-          <a:off x="0" y="0"/>
-          <a:ext cx="0" cy="0"/>
-          <a:chOff x="0" y="0"/>
-          <a:chExt cx="0" cy="0"/>
-        </a:xfrm>
-      </p:grpSpPr>
-      <p:sp>
-        <p:nvSpPr>
-          <p:cNvPr id="2" name="Title 1"/>
-          <p:cNvSpPr>
-            <a:spLocks noGrp="1"/>
-          </p:cNvSpPr>
-          <p:nvPr>
-            <p:ph type="title"/>
-          </p:nvPr>
-        </p:nvSpPr>
-        <p:spPr/>
-        <p:txBody>
-          <a:bodyPr/>
-          <a:lstStyle/>
-          <a:p>
-            <a:r>
-              <a:rPr lang="en-US" dirty="0"/>
-              <a:t>Learning – adjusting weights </a:t>
-            </a:r>
-          </a:p>
-        </p:txBody>
-      </p:sp>
-      <p:sp>
-        <p:nvSpPr>
-          <p:cNvPr id="3" name="Content Placeholder 2"/>
-          <p:cNvSpPr>
-            <a:spLocks noGrp="1"/>
-          </p:cNvSpPr>
-          <p:nvPr>
-            <p:ph idx="1"/>
-          </p:nvPr>
-        </p:nvSpPr>
-        <p:spPr>
-          <a:xfrm>
-            <a:off x="457200" y="1600200"/>
-            <a:ext cx="8229600" cy="4781128"/>
-          </a:xfrm>
-        </p:spPr>
-        <p:txBody>
-          <a:bodyPr/>
-          <a:lstStyle/>
-          <a:p>
-            <a:pPr>
-              <a:buFont typeface="Arial" panose="020B0604020202020204" pitchFamily="34" charset="0"/>
-              <a:buChar char="•"/>
-            </a:pPr>
-            <a:r>
-              <a:rPr lang="en-US" dirty="0"/>
-              <a:t>Adjust weights until some stopping criteria is met</a:t>
-            </a:r>
-          </a:p>
-          <a:p>
-            <a:pPr>
-              <a:buFont typeface="Arial" panose="020B0604020202020204" pitchFamily="34" charset="0"/>
-              <a:buChar char="•"/>
-            </a:pPr>
-            <a:r>
-              <a:rPr lang="en-US" dirty="0"/>
-              <a:t>Weight update is calculated from previous weight</a:t>
-            </a:r>
-          </a:p>
-          <a:p>
-            <a:pPr lvl="1">
-              <a:buFont typeface="Arial" panose="020B0604020202020204" pitchFamily="34" charset="0"/>
-              <a:buChar char="•"/>
-            </a:pPr>
-            <a:r>
-              <a:rPr lang="en-US" dirty="0" err="1"/>
-              <a:t>Wk</a:t>
-            </a:r>
-            <a:r>
-              <a:rPr lang="en-US" dirty="0"/>
-              <a:t>(n+1) = </a:t>
-            </a:r>
-            <a:r>
-              <a:rPr lang="en-US" dirty="0" err="1"/>
-              <a:t>Wk</a:t>
-            </a:r>
-            <a:r>
-              <a:rPr lang="en-US" dirty="0"/>
-              <a:t>(n) + </a:t>
-            </a:r>
-            <a:r>
-              <a:rPr lang="el-GR" dirty="0">
-                <a:latin typeface="times new roman" panose="02020603050405020304" pitchFamily="18" charset="0"/>
-              </a:rPr>
-              <a:t>Δ</a:t>
-            </a:r>
-            <a:r>
-              <a:rPr lang="en-US" dirty="0">
-                <a:latin typeface="times new roman" panose="02020603050405020304" pitchFamily="18" charset="0"/>
-              </a:rPr>
-              <a:t> </a:t>
-            </a:r>
-            <a:r>
-              <a:rPr lang="en-US" dirty="0" err="1"/>
-              <a:t>Wk</a:t>
-            </a:r>
-            <a:r>
-              <a:rPr lang="en-US" dirty="0"/>
-              <a:t>(n)</a:t>
-            </a:r>
-          </a:p>
-          <a:p>
-            <a:pPr lvl="1">
-              <a:buFont typeface="Arial" panose="020B0604020202020204" pitchFamily="34" charset="0"/>
-              <a:buChar char="•"/>
-            </a:pPr>
-            <a:r>
-              <a:rPr lang="en-US" dirty="0"/>
-              <a:t>Learning algorithms differ in calculation of </a:t>
-            </a:r>
-            <a:r>
-              <a:rPr lang="el-GR" b="1" dirty="0">
-                <a:solidFill>
-                  <a:srgbClr val="000000"/>
-                </a:solidFill>
-                <a:latin typeface="times new roman" panose="02020603050405020304" pitchFamily="18" charset="0"/>
-              </a:rPr>
-              <a:t>Δ</a:t>
-            </a:r>
-            <a:r>
-              <a:rPr lang="en-US" b="1" dirty="0">
-                <a:solidFill>
-                  <a:srgbClr val="000000"/>
-                </a:solidFill>
-                <a:latin typeface="times new roman" panose="02020603050405020304" pitchFamily="18" charset="0"/>
-              </a:rPr>
-              <a:t> </a:t>
-            </a:r>
-            <a:r>
-              <a:rPr lang="en-US" b="1" dirty="0" err="1">
-                <a:solidFill>
-                  <a:srgbClr val="000000"/>
-                </a:solidFill>
-              </a:rPr>
-              <a:t>Wk</a:t>
-            </a:r>
-            <a:r>
-              <a:rPr lang="en-US" b="1" dirty="0">
-                <a:solidFill>
-                  <a:srgbClr val="000000"/>
-                </a:solidFill>
-              </a:rPr>
-              <a:t>(n)</a:t>
-            </a:r>
-          </a:p>
-          <a:p>
-            <a:pPr>
-              <a:buFont typeface="Arial" panose="020B0604020202020204" pitchFamily="34" charset="0"/>
-              <a:buChar char="•"/>
-            </a:pPr>
-            <a:r>
-              <a:rPr lang="en-US" dirty="0"/>
-              <a:t>There isn’t a single best learning algorithm</a:t>
-            </a:r>
-          </a:p>
-          <a:p>
-            <a:pPr>
-              <a:buFont typeface="Arial" panose="020B0604020202020204" pitchFamily="34" charset="0"/>
-              <a:buChar char="•"/>
-            </a:pPr>
-            <a:r>
-              <a:rPr lang="en-US" dirty="0"/>
-              <a:t>Learning paradigms:</a:t>
-            </a:r>
-          </a:p>
-          <a:p>
-            <a:pPr lvl="1">
-              <a:buFont typeface="Arial" panose="020B0604020202020204" pitchFamily="34" charset="0"/>
-              <a:buChar char="•"/>
-            </a:pPr>
-            <a:r>
-              <a:rPr lang="en-US" b="1" dirty="0"/>
-              <a:t>supervised</a:t>
-            </a:r>
-          </a:p>
-          <a:p>
-            <a:pPr lvl="1">
-              <a:buFont typeface="Arial" panose="020B0604020202020204" pitchFamily="34" charset="0"/>
-              <a:buChar char="•"/>
-            </a:pPr>
-            <a:r>
-              <a:rPr lang="en-US" dirty="0"/>
-              <a:t>unsupervised</a:t>
-            </a:r>
-          </a:p>
-          <a:p>
-            <a:pPr lvl="1">
-              <a:buFont typeface="Arial" panose="020B0604020202020204" pitchFamily="34" charset="0"/>
-              <a:buChar char="•"/>
-            </a:pPr>
-            <a:r>
-              <a:rPr lang="en-US" dirty="0"/>
-              <a:t>reinforced</a:t>
-            </a:r>
-          </a:p>
-          <a:p>
-            <a:pPr lvl="1">
-              <a:buFont typeface="Arial" panose="020B0604020202020204" pitchFamily="34" charset="0"/>
-              <a:buChar char="•"/>
-            </a:pPr>
-            <a:endParaRPr lang="en-US" dirty="0"/>
-          </a:p>
-          <a:p>
-            <a:pPr>
-              <a:buFont typeface="Arial" panose="020B0604020202020204" pitchFamily="34" charset="0"/>
-              <a:buChar char="•"/>
-            </a:pPr>
-            <a:endParaRPr lang="en-US" dirty="0">
-              <a:solidFill>
-                <a:srgbClr val="000000"/>
-              </a:solidFill>
-            </a:endParaRPr>
-          </a:p>
-          <a:p>
-            <a:pPr>
-              <a:buFont typeface="Arial" panose="020B0604020202020204" pitchFamily="34" charset="0"/>
-              <a:buChar char="•"/>
-            </a:pPr>
-            <a:endParaRPr lang="en-US" dirty="0"/>
-          </a:p>
-        </p:txBody>
-      </p:sp>
-    </p:spTree>
-    <p:extLst>
-      <p:ext uri="{BB962C8B-B14F-4D97-AF65-F5344CB8AC3E}">
-        <p14:creationId xmlns:p14="http://schemas.microsoft.com/office/powerpoint/2010/main" val="1187519242"/>
-      </p:ext>
-    </p:extLst>
-  </p:cSld>
-  <p:clrMapOvr>
-    <a:masterClrMapping/>
-  </p:clrMapOvr>
-  <p:transition>
-    <p:fade thruBlk="1"/>
-  </p:transition>
-</p:sld>
-</file>
-
-<file path=ppt/slides/slide31.xml><?xml version="1.0" encoding="utf-8"?>
 <p:sld xmlns:a="http://schemas.openxmlformats.org/drawingml/2006/main" xmlns:r="http://schemas.openxmlformats.org/officeDocument/2006/relationships" xmlns:p="http://schemas.openxmlformats.org/presentationml/2006/main">
   <p:cSld>
     <p:spTree>
@@ -17739,7 +17487,7 @@
 </p:sld>
 </file>
 
-<file path=ppt/slides/slide32.xml><?xml version="1.0" encoding="utf-8"?>
+<file path=ppt/slides/slide31.xml><?xml version="1.0" encoding="utf-8"?>
 <p:sld xmlns:a="http://schemas.openxmlformats.org/drawingml/2006/main" xmlns:r="http://schemas.openxmlformats.org/officeDocument/2006/relationships" xmlns:p="http://schemas.openxmlformats.org/presentationml/2006/main">
   <p:cSld>
     <p:spTree>
@@ -17911,7 +17659,7 @@
 </p:sld>
 </file>
 
-<file path=ppt/slides/slide33.xml><?xml version="1.0" encoding="utf-8"?>
+<file path=ppt/slides/slide32.xml><?xml version="1.0" encoding="utf-8"?>
 <p:sld xmlns:a="http://schemas.openxmlformats.org/drawingml/2006/main" xmlns:r="http://schemas.openxmlformats.org/officeDocument/2006/relationships" xmlns:p="http://schemas.openxmlformats.org/presentationml/2006/main">
   <p:cSld>
     <p:spTree>
@@ -18692,7 +18440,7 @@
 </p:sld>
 </file>
 
-<file path=ppt/slides/slide34.xml><?xml version="1.0" encoding="utf-8"?>
+<file path=ppt/slides/slide33.xml><?xml version="1.0" encoding="utf-8"?>
 <p:sld xmlns:a="http://schemas.openxmlformats.org/drawingml/2006/main" xmlns:r="http://schemas.openxmlformats.org/officeDocument/2006/relationships" xmlns:p="http://schemas.openxmlformats.org/presentationml/2006/main">
   <p:cSld>
     <p:spTree>
@@ -19082,7 +18830,7 @@
 </p:sld>
 </file>
 
-<file path=ppt/slides/slide35.xml><?xml version="1.0" encoding="utf-8"?>
+<file path=ppt/slides/slide34.xml><?xml version="1.0" encoding="utf-8"?>
 <p:sld xmlns:a="http://schemas.openxmlformats.org/drawingml/2006/main" xmlns:r="http://schemas.openxmlformats.org/officeDocument/2006/relationships" xmlns:p="http://schemas.openxmlformats.org/presentationml/2006/main">
   <p:cSld>
     <p:spTree>
@@ -19766,7 +19514,7 @@
 </p:sld>
 </file>
 
-<file path=ppt/slides/slide36.xml><?xml version="1.0" encoding="utf-8"?>
+<file path=ppt/slides/slide35.xml><?xml version="1.0" encoding="utf-8"?>
 <p:sld xmlns:a="http://schemas.openxmlformats.org/drawingml/2006/main" xmlns:r="http://schemas.openxmlformats.org/officeDocument/2006/relationships" xmlns:p="http://schemas.openxmlformats.org/presentationml/2006/main">
   <p:cSld>
     <p:spTree>
@@ -20461,7 +20209,7 @@
 </p:sld>
 </file>
 
-<file path=ppt/slides/slide37.xml><?xml version="1.0" encoding="utf-8"?>
+<file path=ppt/slides/slide36.xml><?xml version="1.0" encoding="utf-8"?>
 <p:sld xmlns:a="http://schemas.openxmlformats.org/drawingml/2006/main" xmlns:r="http://schemas.openxmlformats.org/officeDocument/2006/relationships" xmlns:p="http://schemas.openxmlformats.org/presentationml/2006/main">
   <p:cSld>
     <p:spTree>
@@ -20801,7 +20549,7 @@
 </p:sld>
 </file>
 
-<file path=ppt/slides/slide38.xml><?xml version="1.0" encoding="utf-8"?>
+<file path=ppt/slides/slide37.xml><?xml version="1.0" encoding="utf-8"?>
 <p:sld xmlns:a="http://schemas.openxmlformats.org/drawingml/2006/main" xmlns:r="http://schemas.openxmlformats.org/officeDocument/2006/relationships" xmlns:p="http://schemas.openxmlformats.org/presentationml/2006/main">
   <p:cSld>
     <p:spTree>
@@ -21035,7 +20783,7 @@
 </p:sld>
 </file>
 
-<file path=ppt/slides/slide39.xml><?xml version="1.0" encoding="utf-8"?>
+<file path=ppt/slides/slide38.xml><?xml version="1.0" encoding="utf-8"?>
 <p:sld xmlns:a="http://schemas.openxmlformats.org/drawingml/2006/main" xmlns:r="http://schemas.openxmlformats.org/officeDocument/2006/relationships" xmlns:p="http://schemas.openxmlformats.org/presentationml/2006/main">
   <p:cSld>
     <p:spTree>
@@ -21620,146 +21368,7 @@
 </p:sld>
 </file>
 
-<file path=ppt/slides/slide4.xml><?xml version="1.0" encoding="utf-8"?>
-<p:sld xmlns:a="http://schemas.openxmlformats.org/drawingml/2006/main" xmlns:r="http://schemas.openxmlformats.org/officeDocument/2006/relationships" xmlns:p="http://schemas.openxmlformats.org/presentationml/2006/main">
-  <p:cSld>
-    <p:spTree>
-      <p:nvGrpSpPr>
-        <p:cNvPr id="1" name=""/>
-        <p:cNvGrpSpPr/>
-        <p:nvPr/>
-      </p:nvGrpSpPr>
-      <p:grpSpPr>
-        <a:xfrm>
-          <a:off x="0" y="0"/>
-          <a:ext cx="0" cy="0"/>
-          <a:chOff x="0" y="0"/>
-          <a:chExt cx="0" cy="0"/>
-        </a:xfrm>
-      </p:grpSpPr>
-      <p:sp>
-        <p:nvSpPr>
-          <p:cNvPr id="2" name="Title 1"/>
-          <p:cNvSpPr>
-            <a:spLocks noGrp="1"/>
-          </p:cNvSpPr>
-          <p:nvPr>
-            <p:ph type="title"/>
-          </p:nvPr>
-        </p:nvSpPr>
-        <p:spPr/>
-        <p:txBody>
-          <a:bodyPr/>
-          <a:lstStyle/>
-          <a:p>
-            <a:r>
-              <a:rPr lang="en-US" dirty="0"/>
-              <a:t>Agenda – part two</a:t>
-            </a:r>
-          </a:p>
-        </p:txBody>
-      </p:sp>
-      <p:sp>
-        <p:nvSpPr>
-          <p:cNvPr id="3" name="Content Placeholder 2"/>
-          <p:cNvSpPr>
-            <a:spLocks noGrp="1"/>
-          </p:cNvSpPr>
-          <p:nvPr>
-            <p:ph idx="1"/>
-          </p:nvPr>
-        </p:nvSpPr>
-        <p:spPr>
-          <a:xfrm>
-            <a:off x="457200" y="1600200"/>
-            <a:ext cx="8229600" cy="4781128"/>
-          </a:xfrm>
-        </p:spPr>
-        <p:txBody>
-          <a:bodyPr/>
-          <a:lstStyle/>
-          <a:p>
-            <a:r>
-              <a:rPr lang="en-US" dirty="0"/>
-              <a:t>Motivational example</a:t>
-            </a:r>
-          </a:p>
-          <a:p>
-            <a:r>
-              <a:rPr lang="en-US" dirty="0"/>
-              <a:t>Neuron model</a:t>
-            </a:r>
-          </a:p>
-          <a:p>
-            <a:r>
-              <a:rPr lang="en-US" dirty="0"/>
-              <a:t>Supervised learning</a:t>
-            </a:r>
-          </a:p>
-          <a:p>
-            <a:r>
-              <a:rPr lang="hr-HR" dirty="0"/>
-              <a:t>Linear separability</a:t>
-            </a:r>
-            <a:endParaRPr lang="en-US" dirty="0"/>
-          </a:p>
-          <a:p>
-            <a:r>
-              <a:rPr lang="en-US" dirty="0"/>
-              <a:t>Perceptron</a:t>
-            </a:r>
-            <a:endParaRPr lang="hr-HR" dirty="0"/>
-          </a:p>
-          <a:p>
-            <a:pPr lvl="1"/>
-            <a:r>
-              <a:rPr lang="en-US" dirty="0"/>
-              <a:t>AND, OR, NAND, XOR</a:t>
-            </a:r>
-          </a:p>
-          <a:p>
-            <a:r>
-              <a:rPr lang="en-US" dirty="0"/>
-              <a:t>Delta rule</a:t>
-            </a:r>
-          </a:p>
-          <a:p>
-            <a:r>
-              <a:rPr lang="en-US" dirty="0"/>
-              <a:t>Unsupervised learning</a:t>
-            </a:r>
-          </a:p>
-          <a:p>
-            <a:r>
-              <a:rPr lang="en-US" dirty="0"/>
-              <a:t>Feed forward networks</a:t>
-            </a:r>
-          </a:p>
-          <a:p>
-            <a:r>
-              <a:rPr lang="en-US" dirty="0"/>
-              <a:t>Backpropagation </a:t>
-            </a:r>
-          </a:p>
-        </p:txBody>
-      </p:sp>
-    </p:spTree>
-    <p:extLst>
-      <p:ext uri="{BB962C8B-B14F-4D97-AF65-F5344CB8AC3E}">
-        <p14:creationId xmlns:p14="http://schemas.microsoft.com/office/powerpoint/2010/main" val="1084645650"/>
-      </p:ext>
-    </p:extLst>
-  </p:cSld>
-  <p:clrMapOvr>
-    <a:masterClrMapping/>
-  </p:clrMapOvr>
-  <p:transition>
-    <p:fade thruBlk="1"/>
-  </p:transition>
-</p:sld>
-</file>
-
-<file path=ppt/slides/slide40.xml><?xml version="1.0" encoding="utf-8"?>
+<file path=ppt/slides/slide39.xml><?xml version="1.0" encoding="utf-8"?>
 <p:sld xmlns:a="http://schemas.openxmlformats.org/drawingml/2006/main" xmlns:r="http://schemas.openxmlformats.org/officeDocument/2006/relationships" xmlns:p="http://schemas.openxmlformats.org/presentationml/2006/main">
   <p:cSld>
     <p:spTree>
@@ -22325,7 +21934,146 @@
 </p:sld>
 </file>
 
-<file path=ppt/slides/slide41.xml><?xml version="1.0" encoding="utf-8"?>
+<file path=ppt/slides/slide4.xml><?xml version="1.0" encoding="utf-8"?>
+<p:sld xmlns:a="http://schemas.openxmlformats.org/drawingml/2006/main" xmlns:r="http://schemas.openxmlformats.org/officeDocument/2006/relationships" xmlns:p="http://schemas.openxmlformats.org/presentationml/2006/main">
+  <p:cSld>
+    <p:spTree>
+      <p:nvGrpSpPr>
+        <p:cNvPr id="1" name=""/>
+        <p:cNvGrpSpPr/>
+        <p:nvPr/>
+      </p:nvGrpSpPr>
+      <p:grpSpPr>
+        <a:xfrm>
+          <a:off x="0" y="0"/>
+          <a:ext cx="0" cy="0"/>
+          <a:chOff x="0" y="0"/>
+          <a:chExt cx="0" cy="0"/>
+        </a:xfrm>
+      </p:grpSpPr>
+      <p:sp>
+        <p:nvSpPr>
+          <p:cNvPr id="2" name="Title 1"/>
+          <p:cNvSpPr>
+            <a:spLocks noGrp="1"/>
+          </p:cNvSpPr>
+          <p:nvPr>
+            <p:ph type="title"/>
+          </p:nvPr>
+        </p:nvSpPr>
+        <p:spPr/>
+        <p:txBody>
+          <a:bodyPr/>
+          <a:lstStyle/>
+          <a:p>
+            <a:r>
+              <a:rPr lang="en-US" dirty="0"/>
+              <a:t>Agenda – part two</a:t>
+            </a:r>
+          </a:p>
+        </p:txBody>
+      </p:sp>
+      <p:sp>
+        <p:nvSpPr>
+          <p:cNvPr id="3" name="Content Placeholder 2"/>
+          <p:cNvSpPr>
+            <a:spLocks noGrp="1"/>
+          </p:cNvSpPr>
+          <p:nvPr>
+            <p:ph idx="1"/>
+          </p:nvPr>
+        </p:nvSpPr>
+        <p:spPr>
+          <a:xfrm>
+            <a:off x="457200" y="1600200"/>
+            <a:ext cx="8229600" cy="4781128"/>
+          </a:xfrm>
+        </p:spPr>
+        <p:txBody>
+          <a:bodyPr/>
+          <a:lstStyle/>
+          <a:p>
+            <a:r>
+              <a:rPr lang="en-US" dirty="0"/>
+              <a:t>Motivational example</a:t>
+            </a:r>
+          </a:p>
+          <a:p>
+            <a:r>
+              <a:rPr lang="en-US" dirty="0"/>
+              <a:t>Neuron model</a:t>
+            </a:r>
+          </a:p>
+          <a:p>
+            <a:r>
+              <a:rPr lang="en-US" dirty="0"/>
+              <a:t>Supervised learning</a:t>
+            </a:r>
+          </a:p>
+          <a:p>
+            <a:r>
+              <a:rPr lang="hr-HR" dirty="0"/>
+              <a:t>Linear separability</a:t>
+            </a:r>
+            <a:endParaRPr lang="en-US" dirty="0"/>
+          </a:p>
+          <a:p>
+            <a:r>
+              <a:rPr lang="en-US" dirty="0"/>
+              <a:t>Perceptron</a:t>
+            </a:r>
+            <a:endParaRPr lang="hr-HR" dirty="0"/>
+          </a:p>
+          <a:p>
+            <a:pPr lvl="1"/>
+            <a:r>
+              <a:rPr lang="en-US" dirty="0"/>
+              <a:t>AND, OR, NAND, XOR</a:t>
+            </a:r>
+          </a:p>
+          <a:p>
+            <a:r>
+              <a:rPr lang="en-US" dirty="0"/>
+              <a:t>Delta rule</a:t>
+            </a:r>
+          </a:p>
+          <a:p>
+            <a:r>
+              <a:rPr lang="en-US" dirty="0"/>
+              <a:t>Unsupervised learning</a:t>
+            </a:r>
+          </a:p>
+          <a:p>
+            <a:r>
+              <a:rPr lang="en-US" dirty="0"/>
+              <a:t>Feed forward networks</a:t>
+            </a:r>
+          </a:p>
+          <a:p>
+            <a:r>
+              <a:rPr lang="en-US" dirty="0"/>
+              <a:t>Backpropagation </a:t>
+            </a:r>
+          </a:p>
+        </p:txBody>
+      </p:sp>
+    </p:spTree>
+    <p:extLst>
+      <p:ext uri="{BB962C8B-B14F-4D97-AF65-F5344CB8AC3E}">
+        <p14:creationId xmlns:p14="http://schemas.microsoft.com/office/powerpoint/2010/main" val="1084645650"/>
+      </p:ext>
+    </p:extLst>
+  </p:cSld>
+  <p:clrMapOvr>
+    <a:masterClrMapping/>
+  </p:clrMapOvr>
+  <p:transition>
+    <p:fade thruBlk="1"/>
+  </p:transition>
+</p:sld>
+</file>
+
+<file path=ppt/slides/slide40.xml><?xml version="1.0" encoding="utf-8"?>
 <p:sld xmlns:a="http://schemas.openxmlformats.org/drawingml/2006/main" xmlns:r="http://schemas.openxmlformats.org/officeDocument/2006/relationships" xmlns:p="http://schemas.openxmlformats.org/presentationml/2006/main">
   <p:cSld>
     <p:spTree>
@@ -23342,7 +23090,7 @@
 </p:sld>
 </file>
 
-<file path=ppt/slides/slide42.xml><?xml version="1.0" encoding="utf-8"?>
+<file path=ppt/slides/slide41.xml><?xml version="1.0" encoding="utf-8"?>
 <p:sld xmlns:a="http://schemas.openxmlformats.org/drawingml/2006/main" xmlns:r="http://schemas.openxmlformats.org/officeDocument/2006/relationships" xmlns:p="http://schemas.openxmlformats.org/presentationml/2006/main">
   <p:cSld>
     <p:spTree>
@@ -23964,7 +23712,7 @@
 </p:sld>
 </file>
 
-<file path=ppt/slides/slide43.xml><?xml version="1.0" encoding="utf-8"?>
+<file path=ppt/slides/slide42.xml><?xml version="1.0" encoding="utf-8"?>
 <p:sld xmlns:a="http://schemas.openxmlformats.org/drawingml/2006/main" xmlns:r="http://schemas.openxmlformats.org/officeDocument/2006/relationships" xmlns:p="http://schemas.openxmlformats.org/presentationml/2006/main">
   <p:cSld>
     <p:spTree>
@@ -24280,7 +24028,7 @@
 </p:sld>
 </file>
 
-<file path=ppt/slides/slide44.xml><?xml version="1.0" encoding="utf-8"?>
+<file path=ppt/slides/slide43.xml><?xml version="1.0" encoding="utf-8"?>
 <p:sld xmlns:a="http://schemas.openxmlformats.org/drawingml/2006/main" xmlns:r="http://schemas.openxmlformats.org/officeDocument/2006/relationships" xmlns:p="http://schemas.openxmlformats.org/presentationml/2006/main">
   <p:cSld>
     <p:spTree>
@@ -25840,7 +25588,7 @@
 </p:sld>
 </file>
 
-<file path=ppt/slides/slide45.xml><?xml version="1.0" encoding="utf-8"?>
+<file path=ppt/slides/slide44.xml><?xml version="1.0" encoding="utf-8"?>
 <p:sld xmlns:a="http://schemas.openxmlformats.org/drawingml/2006/main" xmlns:r="http://schemas.openxmlformats.org/officeDocument/2006/relationships" xmlns:p="http://schemas.openxmlformats.org/presentationml/2006/main">
   <p:cSld>
     <p:spTree>
@@ -26518,7 +26266,7 @@
 </p:sld>
 </file>
 
-<file path=ppt/slides/slide46.xml><?xml version="1.0" encoding="utf-8"?>
+<file path=ppt/slides/slide45.xml><?xml version="1.0" encoding="utf-8"?>
 <p:sld xmlns:a="http://schemas.openxmlformats.org/drawingml/2006/main" xmlns:r="http://schemas.openxmlformats.org/officeDocument/2006/relationships" xmlns:p="http://schemas.openxmlformats.org/presentationml/2006/main">
   <p:cSld>
     <p:spTree>
@@ -26922,7 +26670,7 @@
 </p:sld>
 </file>
 
-<file path=ppt/slides/slide47.xml><?xml version="1.0" encoding="utf-8"?>
+<file path=ppt/slides/slide46.xml><?xml version="1.0" encoding="utf-8"?>
 <p:sld xmlns:a="http://schemas.openxmlformats.org/drawingml/2006/main" xmlns:r="http://schemas.openxmlformats.org/officeDocument/2006/relationships" xmlns:p="http://schemas.openxmlformats.org/presentationml/2006/main">
   <p:cSld>
     <p:spTree>
@@ -27062,7 +26810,7 @@
 </p:sld>
 </file>
 
-<file path=ppt/slides/slide48.xml><?xml version="1.0" encoding="utf-8"?>
+<file path=ppt/slides/slide47.xml><?xml version="1.0" encoding="utf-8"?>
 <p:sld xmlns:a="http://schemas.openxmlformats.org/drawingml/2006/main" xmlns:r="http://schemas.openxmlformats.org/officeDocument/2006/relationships" xmlns:p="http://schemas.openxmlformats.org/presentationml/2006/main">
   <p:cSld>
     <p:spTree>
@@ -27610,7 +27358,7 @@
 </p:sld>
 </file>
 
-<file path=ppt/slides/slide49.xml><?xml version="1.0" encoding="utf-8"?>
+<file path=ppt/slides/slide48.xml><?xml version="1.0" encoding="utf-8"?>
 <p:sld xmlns:a="http://schemas.openxmlformats.org/drawingml/2006/main" xmlns:r="http://schemas.openxmlformats.org/officeDocument/2006/relationships" xmlns:p="http://schemas.openxmlformats.org/presentationml/2006/main">
   <p:cSld>
     <p:spTree>
@@ -27821,6 +27569,296 @@
     <p:extLst>
       <p:ext uri="{BB962C8B-B14F-4D97-AF65-F5344CB8AC3E}">
         <p14:creationId xmlns:p14="http://schemas.microsoft.com/office/powerpoint/2010/main" val="3454918851"/>
+      </p:ext>
+    </p:extLst>
+  </p:cSld>
+  <p:clrMapOvr>
+    <a:masterClrMapping/>
+  </p:clrMapOvr>
+  <p:transition>
+    <p:fade thruBlk="1"/>
+  </p:transition>
+</p:sld>
+</file>
+
+<file path=ppt/slides/slide49.xml><?xml version="1.0" encoding="utf-8"?>
+<p:sld xmlns:a="http://schemas.openxmlformats.org/drawingml/2006/main" xmlns:r="http://schemas.openxmlformats.org/officeDocument/2006/relationships" xmlns:p="http://schemas.openxmlformats.org/presentationml/2006/main">
+  <p:cSld>
+    <p:spTree>
+      <p:nvGrpSpPr>
+        <p:cNvPr id="1" name=""/>
+        <p:cNvGrpSpPr/>
+        <p:nvPr/>
+      </p:nvGrpSpPr>
+      <p:grpSpPr>
+        <a:xfrm>
+          <a:off x="0" y="0"/>
+          <a:ext cx="0" cy="0"/>
+          <a:chOff x="0" y="0"/>
+          <a:chExt cx="0" cy="0"/>
+        </a:xfrm>
+      </p:grpSpPr>
+      <p:sp>
+        <p:nvSpPr>
+          <p:cNvPr id="2" name="Title 1"/>
+          <p:cNvSpPr>
+            <a:spLocks noGrp="1"/>
+          </p:cNvSpPr>
+          <p:nvPr>
+            <p:ph type="title"/>
+          </p:nvPr>
+        </p:nvSpPr>
+        <p:spPr/>
+        <p:txBody>
+          <a:bodyPr/>
+          <a:lstStyle/>
+          <a:p>
+            <a:r>
+              <a:rPr lang="en-US" dirty="0"/>
+              <a:t>Error surface</a:t>
+            </a:r>
+          </a:p>
+        </p:txBody>
+      </p:sp>
+      <mc:AlternateContent xmlns:mc="http://schemas.openxmlformats.org/markup-compatibility/2006" xmlns:a14="http://schemas.microsoft.com/office/drawing/2010/main">
+        <mc:Choice Requires="a14">
+          <p:sp>
+            <p:nvSpPr>
+              <p:cNvPr id="3" name="Content Placeholder 2"/>
+              <p:cNvSpPr>
+                <a:spLocks noGrp="1"/>
+              </p:cNvSpPr>
+              <p:nvPr>
+                <p:ph idx="1"/>
+              </p:nvPr>
+            </p:nvSpPr>
+            <p:spPr>
+              <a:xfrm>
+                <a:off x="457200" y="1600200"/>
+                <a:ext cx="8229600" cy="4781128"/>
+              </a:xfrm>
+            </p:spPr>
+            <p:txBody>
+              <a:bodyPr/>
+              <a:lstStyle/>
+              <a:p>
+                <a:pPr>
+                  <a:buFont typeface="Arial" panose="020B0604020202020204" pitchFamily="34" charset="0"/>
+                  <a:buChar char="•"/>
+                </a:pPr>
+                <a:endParaRPr lang="en-US" dirty="0">
+                  <a:solidFill>
+                    <a:srgbClr val="000000"/>
+                  </a:solidFill>
+                </a:endParaRPr>
+              </a:p>
+              <a:p>
+                <a:pPr>
+                  <a:buFont typeface="Arial" panose="020B0604020202020204" pitchFamily="34" charset="0"/>
+                  <a:buChar char="•"/>
+                </a:pPr>
+                <a:endParaRPr lang="en-US" dirty="0">
+                  <a:solidFill>
+                    <a:srgbClr val="000000"/>
+                  </a:solidFill>
+                </a:endParaRPr>
+              </a:p>
+              <a:p>
+                <a:pPr>
+                  <a:buFont typeface="Arial" panose="020B0604020202020204" pitchFamily="34" charset="0"/>
+                  <a:buChar char="•"/>
+                </a:pPr>
+                <a:endParaRPr lang="en-US" dirty="0">
+                  <a:solidFill>
+                    <a:srgbClr val="000000"/>
+                  </a:solidFill>
+                </a:endParaRPr>
+              </a:p>
+              <a:p>
+                <a:pPr>
+                  <a:buFont typeface="Arial" panose="020B0604020202020204" pitchFamily="34" charset="0"/>
+                  <a:buChar char="•"/>
+                </a:pPr>
+                <a:endParaRPr lang="en-US" dirty="0">
+                  <a:solidFill>
+                    <a:srgbClr val="000000"/>
+                  </a:solidFill>
+                </a:endParaRPr>
+              </a:p>
+              <a:p>
+                <a:pPr>
+                  <a:buFont typeface="Arial" panose="020B0604020202020204" pitchFamily="34" charset="0"/>
+                  <a:buChar char="•"/>
+                </a:pPr>
+                <a:endParaRPr lang="en-US" dirty="0">
+                  <a:solidFill>
+                    <a:srgbClr val="000000"/>
+                  </a:solidFill>
+                </a:endParaRPr>
+              </a:p>
+              <a:p>
+                <a:pPr marL="0" indent="0">
+                  <a:buNone/>
+                </a:pPr>
+                <a:endParaRPr lang="en-US" dirty="0">
+                  <a:solidFill>
+                    <a:srgbClr val="000000"/>
+                  </a:solidFill>
+                </a:endParaRPr>
+              </a:p>
+              <a:p>
+                <a:pPr lvl="1">
+                  <a:buFont typeface="Arial" panose="020B0604020202020204" pitchFamily="34" charset="0"/>
+                  <a:buChar char="•"/>
+                </a:pPr>
+                <a:r>
+                  <a:rPr lang="en-US" sz="1600" dirty="0">
+                    <a:solidFill>
+                      <a:srgbClr val="000000"/>
+                    </a:solidFill>
+                    <a:hlinkClick r:id="rId3"/>
+                  </a:rPr>
+                  <a:t>https://qph.ec.quoracdn.net/main-qimg-abfbe698dd41306dc2691e8d0c3182a0.webp</a:t>
+                </a:r>
+                <a:endParaRPr lang="en-US" sz="1600" dirty="0">
+                  <a:solidFill>
+                    <a:srgbClr val="000000"/>
+                  </a:solidFill>
+                </a:endParaRPr>
+              </a:p>
+              <a:p>
+                <a:pPr>
+                  <a:buFont typeface="Arial" panose="020B0604020202020204" pitchFamily="34" charset="0"/>
+                  <a:buChar char="•"/>
+                </a:pPr>
+                <a:r>
+                  <a:rPr lang="en-US" dirty="0"/>
+                  <a:t>Local vs Global minima</a:t>
+                </a:r>
+              </a:p>
+              <a:p>
+                <a:pPr lvl="1">
+                  <a:buFont typeface="Arial" panose="020B0604020202020204" pitchFamily="34" charset="0"/>
+                  <a:buChar char="•"/>
+                </a:pPr>
+                <a14:m>
+                  <m:oMath xmlns:m="http://schemas.openxmlformats.org/officeDocument/2006/math">
+                    <m:r>
+                      <m:rPr>
+                        <m:nor/>
+                      </m:rPr>
+                      <a:rPr lang="el-GR" sz="2000" dirty="0"/>
+                      <m:t>η</m:t>
+                    </m:r>
+                  </m:oMath>
+                </a14:m>
+                <a:r>
+                  <a:rPr lang="en-US" sz="2000" dirty="0"/>
+                  <a:t>: learning rate factor</a:t>
+                </a:r>
+                <a:endParaRPr lang="en-US" sz="1600" dirty="0">
+                  <a:solidFill>
+                    <a:srgbClr val="000000"/>
+                  </a:solidFill>
+                </a:endParaRPr>
+              </a:p>
+              <a:p>
+                <a:pPr lvl="1">
+                  <a:buFont typeface="Arial" panose="020B0604020202020204" pitchFamily="34" charset="0"/>
+                  <a:buChar char="•"/>
+                </a:pPr>
+                <a:endParaRPr lang="en-US" sz="1600" dirty="0">
+                  <a:solidFill>
+                    <a:srgbClr val="000000"/>
+                  </a:solidFill>
+                </a:endParaRPr>
+              </a:p>
+              <a:p>
+                <a:pPr>
+                  <a:buFont typeface="Arial" panose="020B0604020202020204" pitchFamily="34" charset="0"/>
+                  <a:buChar char="•"/>
+                </a:pPr>
+                <a:endParaRPr lang="en-US" sz="1900" dirty="0">
+                  <a:solidFill>
+                    <a:srgbClr val="000000"/>
+                  </a:solidFill>
+                </a:endParaRPr>
+              </a:p>
+            </p:txBody>
+          </p:sp>
+        </mc:Choice>
+        <mc:Fallback xmlns="">
+          <p:sp>
+            <p:nvSpPr>
+              <p:cNvPr id="3" name="Content Placeholder 2"/>
+              <p:cNvSpPr>
+                <a:spLocks noGrp="1" noRot="1" noChangeAspect="1" noMove="1" noResize="1" noEditPoints="1" noAdjustHandles="1" noChangeArrowheads="1" noChangeShapeType="1" noTextEdit="1"/>
+              </p:cNvSpPr>
+              <p:nvPr>
+                <p:ph idx="1"/>
+              </p:nvPr>
+            </p:nvSpPr>
+            <p:spPr>
+              <a:xfrm>
+                <a:off x="457200" y="1600200"/>
+                <a:ext cx="8229600" cy="4781128"/>
+              </a:xfrm>
+              <a:blipFill>
+                <a:blip r:embed="rId4"/>
+                <a:stretch>
+                  <a:fillRect l="-1407"/>
+                </a:stretch>
+              </a:blipFill>
+            </p:spPr>
+            <p:txBody>
+              <a:bodyPr/>
+              <a:lstStyle/>
+              <a:p>
+                <a:r>
+                  <a:rPr lang="hr-HR">
+                    <a:noFill/>
+                  </a:rPr>
+                  <a:t> </a:t>
+                </a:r>
+              </a:p>
+            </p:txBody>
+          </p:sp>
+        </mc:Fallback>
+      </mc:AlternateContent>
+      <p:pic>
+        <p:nvPicPr>
+          <p:cNvPr id="5" name="Picture 4"/>
+          <p:cNvPicPr>
+            <a:picLocks noChangeAspect="1"/>
+          </p:cNvPicPr>
+          <p:nvPr/>
+        </p:nvPicPr>
+        <p:blipFill>
+          <a:blip r:embed="rId5">
+            <a:extLst>
+              <a:ext uri="{28A0092B-C50C-407E-A947-70E740481C1C}">
+                <a14:useLocalDpi xmlns:a14="http://schemas.microsoft.com/office/drawing/2010/main" val="0"/>
+              </a:ext>
+            </a:extLst>
+          </a:blip>
+          <a:stretch>
+            <a:fillRect/>
+          </a:stretch>
+        </p:blipFill>
+        <p:spPr>
+          <a:xfrm>
+            <a:off x="971600" y="1844824"/>
+            <a:ext cx="4896544" cy="2664296"/>
+          </a:xfrm>
+          <a:prstGeom prst="rect">
+            <a:avLst/>
+          </a:prstGeom>
+        </p:spPr>
+      </p:pic>
+    </p:spTree>
+    <p:extLst>
+      <p:ext uri="{BB962C8B-B14F-4D97-AF65-F5344CB8AC3E}">
+        <p14:creationId xmlns:p14="http://schemas.microsoft.com/office/powerpoint/2010/main" val="130177745"/>
       </p:ext>
     </p:extLst>
   </p:cSld>
@@ -28302,296 +28340,6 @@
           <a:p>
             <a:r>
               <a:rPr lang="en-US" dirty="0"/>
-              <a:t>Error surface</a:t>
-            </a:r>
-          </a:p>
-        </p:txBody>
-      </p:sp>
-      <mc:AlternateContent xmlns:mc="http://schemas.openxmlformats.org/markup-compatibility/2006" xmlns:a14="http://schemas.microsoft.com/office/drawing/2010/main">
-        <mc:Choice Requires="a14">
-          <p:sp>
-            <p:nvSpPr>
-              <p:cNvPr id="3" name="Content Placeholder 2"/>
-              <p:cNvSpPr>
-                <a:spLocks noGrp="1"/>
-              </p:cNvSpPr>
-              <p:nvPr>
-                <p:ph idx="1"/>
-              </p:nvPr>
-            </p:nvSpPr>
-            <p:spPr>
-              <a:xfrm>
-                <a:off x="457200" y="1600200"/>
-                <a:ext cx="8229600" cy="4781128"/>
-              </a:xfrm>
-            </p:spPr>
-            <p:txBody>
-              <a:bodyPr/>
-              <a:lstStyle/>
-              <a:p>
-                <a:pPr>
-                  <a:buFont typeface="Arial" panose="020B0604020202020204" pitchFamily="34" charset="0"/>
-                  <a:buChar char="•"/>
-                </a:pPr>
-                <a:endParaRPr lang="en-US" dirty="0">
-                  <a:solidFill>
-                    <a:srgbClr val="000000"/>
-                  </a:solidFill>
-                </a:endParaRPr>
-              </a:p>
-              <a:p>
-                <a:pPr>
-                  <a:buFont typeface="Arial" panose="020B0604020202020204" pitchFamily="34" charset="0"/>
-                  <a:buChar char="•"/>
-                </a:pPr>
-                <a:endParaRPr lang="en-US" dirty="0">
-                  <a:solidFill>
-                    <a:srgbClr val="000000"/>
-                  </a:solidFill>
-                </a:endParaRPr>
-              </a:p>
-              <a:p>
-                <a:pPr>
-                  <a:buFont typeface="Arial" panose="020B0604020202020204" pitchFamily="34" charset="0"/>
-                  <a:buChar char="•"/>
-                </a:pPr>
-                <a:endParaRPr lang="en-US" dirty="0">
-                  <a:solidFill>
-                    <a:srgbClr val="000000"/>
-                  </a:solidFill>
-                </a:endParaRPr>
-              </a:p>
-              <a:p>
-                <a:pPr>
-                  <a:buFont typeface="Arial" panose="020B0604020202020204" pitchFamily="34" charset="0"/>
-                  <a:buChar char="•"/>
-                </a:pPr>
-                <a:endParaRPr lang="en-US" dirty="0">
-                  <a:solidFill>
-                    <a:srgbClr val="000000"/>
-                  </a:solidFill>
-                </a:endParaRPr>
-              </a:p>
-              <a:p>
-                <a:pPr>
-                  <a:buFont typeface="Arial" panose="020B0604020202020204" pitchFamily="34" charset="0"/>
-                  <a:buChar char="•"/>
-                </a:pPr>
-                <a:endParaRPr lang="en-US" dirty="0">
-                  <a:solidFill>
-                    <a:srgbClr val="000000"/>
-                  </a:solidFill>
-                </a:endParaRPr>
-              </a:p>
-              <a:p>
-                <a:pPr marL="0" indent="0">
-                  <a:buNone/>
-                </a:pPr>
-                <a:endParaRPr lang="en-US" dirty="0">
-                  <a:solidFill>
-                    <a:srgbClr val="000000"/>
-                  </a:solidFill>
-                </a:endParaRPr>
-              </a:p>
-              <a:p>
-                <a:pPr lvl="1">
-                  <a:buFont typeface="Arial" panose="020B0604020202020204" pitchFamily="34" charset="0"/>
-                  <a:buChar char="•"/>
-                </a:pPr>
-                <a:r>
-                  <a:rPr lang="en-US" sz="1600" dirty="0">
-                    <a:solidFill>
-                      <a:srgbClr val="000000"/>
-                    </a:solidFill>
-                    <a:hlinkClick r:id="rId3"/>
-                  </a:rPr>
-                  <a:t>https://qph.ec.quoracdn.net/main-qimg-abfbe698dd41306dc2691e8d0c3182a0.webp</a:t>
-                </a:r>
-                <a:endParaRPr lang="en-US" sz="1600" dirty="0">
-                  <a:solidFill>
-                    <a:srgbClr val="000000"/>
-                  </a:solidFill>
-                </a:endParaRPr>
-              </a:p>
-              <a:p>
-                <a:pPr>
-                  <a:buFont typeface="Arial" panose="020B0604020202020204" pitchFamily="34" charset="0"/>
-                  <a:buChar char="•"/>
-                </a:pPr>
-                <a:r>
-                  <a:rPr lang="en-US" dirty="0"/>
-                  <a:t>Local vs Global minima</a:t>
-                </a:r>
-              </a:p>
-              <a:p>
-                <a:pPr lvl="1">
-                  <a:buFont typeface="Arial" panose="020B0604020202020204" pitchFamily="34" charset="0"/>
-                  <a:buChar char="•"/>
-                </a:pPr>
-                <a14:m>
-                  <m:oMath xmlns:m="http://schemas.openxmlformats.org/officeDocument/2006/math">
-                    <m:r>
-                      <m:rPr>
-                        <m:nor/>
-                      </m:rPr>
-                      <a:rPr lang="el-GR" sz="2000" dirty="0"/>
-                      <m:t>η</m:t>
-                    </m:r>
-                  </m:oMath>
-                </a14:m>
-                <a:r>
-                  <a:rPr lang="en-US" sz="2000" dirty="0"/>
-                  <a:t>: learning rate factor</a:t>
-                </a:r>
-                <a:endParaRPr lang="en-US" sz="1600" dirty="0">
-                  <a:solidFill>
-                    <a:srgbClr val="000000"/>
-                  </a:solidFill>
-                </a:endParaRPr>
-              </a:p>
-              <a:p>
-                <a:pPr lvl="1">
-                  <a:buFont typeface="Arial" panose="020B0604020202020204" pitchFamily="34" charset="0"/>
-                  <a:buChar char="•"/>
-                </a:pPr>
-                <a:endParaRPr lang="en-US" sz="1600" dirty="0">
-                  <a:solidFill>
-                    <a:srgbClr val="000000"/>
-                  </a:solidFill>
-                </a:endParaRPr>
-              </a:p>
-              <a:p>
-                <a:pPr>
-                  <a:buFont typeface="Arial" panose="020B0604020202020204" pitchFamily="34" charset="0"/>
-                  <a:buChar char="•"/>
-                </a:pPr>
-                <a:endParaRPr lang="en-US" sz="1900" dirty="0">
-                  <a:solidFill>
-                    <a:srgbClr val="000000"/>
-                  </a:solidFill>
-                </a:endParaRPr>
-              </a:p>
-            </p:txBody>
-          </p:sp>
-        </mc:Choice>
-        <mc:Fallback xmlns="">
-          <p:sp>
-            <p:nvSpPr>
-              <p:cNvPr id="3" name="Content Placeholder 2"/>
-              <p:cNvSpPr>
-                <a:spLocks noGrp="1" noRot="1" noChangeAspect="1" noMove="1" noResize="1" noEditPoints="1" noAdjustHandles="1" noChangeArrowheads="1" noChangeShapeType="1" noTextEdit="1"/>
-              </p:cNvSpPr>
-              <p:nvPr>
-                <p:ph idx="1"/>
-              </p:nvPr>
-            </p:nvSpPr>
-            <p:spPr>
-              <a:xfrm>
-                <a:off x="457200" y="1600200"/>
-                <a:ext cx="8229600" cy="4781128"/>
-              </a:xfrm>
-              <a:blipFill>
-                <a:blip r:embed="rId4"/>
-                <a:stretch>
-                  <a:fillRect l="-1407"/>
-                </a:stretch>
-              </a:blipFill>
-            </p:spPr>
-            <p:txBody>
-              <a:bodyPr/>
-              <a:lstStyle/>
-              <a:p>
-                <a:r>
-                  <a:rPr lang="hr-HR">
-                    <a:noFill/>
-                  </a:rPr>
-                  <a:t> </a:t>
-                </a:r>
-              </a:p>
-            </p:txBody>
-          </p:sp>
-        </mc:Fallback>
-      </mc:AlternateContent>
-      <p:pic>
-        <p:nvPicPr>
-          <p:cNvPr id="5" name="Picture 4"/>
-          <p:cNvPicPr>
-            <a:picLocks noChangeAspect="1"/>
-          </p:cNvPicPr>
-          <p:nvPr/>
-        </p:nvPicPr>
-        <p:blipFill>
-          <a:blip r:embed="rId5">
-            <a:extLst>
-              <a:ext uri="{28A0092B-C50C-407E-A947-70E740481C1C}">
-                <a14:useLocalDpi xmlns:a14="http://schemas.microsoft.com/office/drawing/2010/main" val="0"/>
-              </a:ext>
-            </a:extLst>
-          </a:blip>
-          <a:stretch>
-            <a:fillRect/>
-          </a:stretch>
-        </p:blipFill>
-        <p:spPr>
-          <a:xfrm>
-            <a:off x="971600" y="1844824"/>
-            <a:ext cx="4896544" cy="2664296"/>
-          </a:xfrm>
-          <a:prstGeom prst="rect">
-            <a:avLst/>
-          </a:prstGeom>
-        </p:spPr>
-      </p:pic>
-    </p:spTree>
-    <p:extLst>
-      <p:ext uri="{BB962C8B-B14F-4D97-AF65-F5344CB8AC3E}">
-        <p14:creationId xmlns:p14="http://schemas.microsoft.com/office/powerpoint/2010/main" val="130177745"/>
-      </p:ext>
-    </p:extLst>
-  </p:cSld>
-  <p:clrMapOvr>
-    <a:masterClrMapping/>
-  </p:clrMapOvr>
-  <p:transition>
-    <p:fade thruBlk="1"/>
-  </p:transition>
-</p:sld>
-</file>
-
-<file path=ppt/slides/slide51.xml><?xml version="1.0" encoding="utf-8"?>
-<p:sld xmlns:a="http://schemas.openxmlformats.org/drawingml/2006/main" xmlns:r="http://schemas.openxmlformats.org/officeDocument/2006/relationships" xmlns:p="http://schemas.openxmlformats.org/presentationml/2006/main">
-  <p:cSld>
-    <p:spTree>
-      <p:nvGrpSpPr>
-        <p:cNvPr id="1" name=""/>
-        <p:cNvGrpSpPr/>
-        <p:nvPr/>
-      </p:nvGrpSpPr>
-      <p:grpSpPr>
-        <a:xfrm>
-          <a:off x="0" y="0"/>
-          <a:ext cx="0" cy="0"/>
-          <a:chOff x="0" y="0"/>
-          <a:chExt cx="0" cy="0"/>
-        </a:xfrm>
-      </p:grpSpPr>
-      <p:sp>
-        <p:nvSpPr>
-          <p:cNvPr id="2" name="Title 1"/>
-          <p:cNvSpPr>
-            <a:spLocks noGrp="1"/>
-          </p:cNvSpPr>
-          <p:nvPr>
-            <p:ph type="title"/>
-          </p:nvPr>
-        </p:nvSpPr>
-        <p:spPr/>
-        <p:txBody>
-          <a:bodyPr/>
-          <a:lstStyle/>
-          <a:p>
-            <a:r>
-              <a:rPr lang="en-US" dirty="0"/>
               <a:t>Stopping criteria</a:t>
             </a:r>
           </a:p>
@@ -28920,7 +28668,7 @@
 </p:sld>
 </file>
 
-<file path=ppt/slides/slide52.xml><?xml version="1.0" encoding="utf-8"?>
+<file path=ppt/slides/slide51.xml><?xml version="1.0" encoding="utf-8"?>
 <p:sld xmlns:a="http://schemas.openxmlformats.org/drawingml/2006/main" xmlns:r="http://schemas.openxmlformats.org/officeDocument/2006/relationships" xmlns:p="http://schemas.openxmlformats.org/presentationml/2006/main">
   <p:cSld>
     <p:spTree>
@@ -29405,7 +29153,7 @@
 </p:sld>
 </file>
 
-<file path=ppt/slides/slide53.xml><?xml version="1.0" encoding="utf-8"?>
+<file path=ppt/slides/slide52.xml><?xml version="1.0" encoding="utf-8"?>
 <p:sld xmlns:a="http://schemas.openxmlformats.org/drawingml/2006/main" xmlns:r="http://schemas.openxmlformats.org/officeDocument/2006/relationships" xmlns:p="http://schemas.openxmlformats.org/presentationml/2006/main">
   <p:cSld>
     <p:spTree>
@@ -29570,6 +29318,186 @@
 </p:sld>
 </file>
 
+<file path=ppt/slides/slide53.xml><?xml version="1.0" encoding="utf-8"?>
+<p:sld xmlns:a="http://schemas.openxmlformats.org/drawingml/2006/main" xmlns:r="http://schemas.openxmlformats.org/officeDocument/2006/relationships" xmlns:p="http://schemas.openxmlformats.org/presentationml/2006/main">
+  <p:cSld>
+    <p:spTree>
+      <p:nvGrpSpPr>
+        <p:cNvPr id="1" name=""/>
+        <p:cNvGrpSpPr/>
+        <p:nvPr/>
+      </p:nvGrpSpPr>
+      <p:grpSpPr>
+        <a:xfrm>
+          <a:off x="0" y="0"/>
+          <a:ext cx="0" cy="0"/>
+          <a:chOff x="0" y="0"/>
+          <a:chExt cx="0" cy="0"/>
+        </a:xfrm>
+      </p:grpSpPr>
+      <p:sp>
+        <p:nvSpPr>
+          <p:cNvPr id="2" name="Title 1"/>
+          <p:cNvSpPr>
+            <a:spLocks noGrp="1"/>
+          </p:cNvSpPr>
+          <p:nvPr>
+            <p:ph type="title"/>
+          </p:nvPr>
+        </p:nvSpPr>
+        <p:spPr/>
+        <p:txBody>
+          <a:bodyPr/>
+          <a:lstStyle/>
+          <a:p>
+            <a:r>
+              <a:rPr lang="en-US" dirty="0"/>
+              <a:t>Feed forward network</a:t>
+            </a:r>
+          </a:p>
+        </p:txBody>
+      </p:sp>
+      <p:sp>
+        <p:nvSpPr>
+          <p:cNvPr id="3" name="Content Placeholder 2"/>
+          <p:cNvSpPr>
+            <a:spLocks noGrp="1"/>
+          </p:cNvSpPr>
+          <p:nvPr>
+            <p:ph idx="1"/>
+          </p:nvPr>
+        </p:nvSpPr>
+        <p:spPr>
+          <a:xfrm>
+            <a:off x="457200" y="1600200"/>
+            <a:ext cx="8229600" cy="4781128"/>
+          </a:xfrm>
+        </p:spPr>
+        <p:txBody>
+          <a:bodyPr/>
+          <a:lstStyle/>
+          <a:p>
+            <a:pPr>
+              <a:buFont typeface="Arial" panose="020B0604020202020204" pitchFamily="34" charset="0"/>
+              <a:buChar char="•"/>
+            </a:pPr>
+            <a:r>
+              <a:rPr lang="en-US" dirty="0"/>
+              <a:t>Single </a:t>
+            </a:r>
+            <a:r>
+              <a:rPr lang="en-US" b="1" dirty="0"/>
+              <a:t>input</a:t>
+            </a:r>
+            <a:r>
+              <a:rPr lang="en-US" dirty="0"/>
+              <a:t> layer</a:t>
+            </a:r>
+          </a:p>
+          <a:p>
+            <a:pPr lvl="1">
+              <a:buFont typeface="Arial" panose="020B0604020202020204" pitchFamily="34" charset="0"/>
+              <a:buChar char="•"/>
+            </a:pPr>
+            <a:r>
+              <a:rPr lang="en-US" dirty="0"/>
+              <a:t>One neuron for each data feature</a:t>
+            </a:r>
+          </a:p>
+          <a:p>
+            <a:pPr>
+              <a:buFont typeface="Arial" panose="020B0604020202020204" pitchFamily="34" charset="0"/>
+              <a:buChar char="•"/>
+            </a:pPr>
+            <a:r>
+              <a:rPr lang="en-US" dirty="0"/>
+              <a:t>Single </a:t>
+            </a:r>
+            <a:r>
+              <a:rPr lang="en-US" b="1" dirty="0"/>
+              <a:t>output</a:t>
+            </a:r>
+            <a:r>
+              <a:rPr lang="en-US" dirty="0"/>
+              <a:t> layer</a:t>
+            </a:r>
+          </a:p>
+          <a:p>
+            <a:pPr lvl="1">
+              <a:buFont typeface="Arial" panose="020B0604020202020204" pitchFamily="34" charset="0"/>
+              <a:buChar char="•"/>
+            </a:pPr>
+            <a:r>
+              <a:rPr lang="en-US" dirty="0"/>
+              <a:t>One neuron for binary classification</a:t>
+            </a:r>
+          </a:p>
+          <a:p>
+            <a:pPr lvl="1">
+              <a:buFont typeface="Arial" panose="020B0604020202020204" pitchFamily="34" charset="0"/>
+              <a:buChar char="•"/>
+            </a:pPr>
+            <a:r>
+              <a:rPr lang="en-US" dirty="0"/>
+              <a:t>One neuron for each class in multi-class classification</a:t>
+            </a:r>
+          </a:p>
+          <a:p>
+            <a:pPr lvl="2">
+              <a:buFont typeface="Arial" panose="020B0604020202020204" pitchFamily="34" charset="0"/>
+              <a:buChar char="•"/>
+            </a:pPr>
+            <a:r>
+              <a:rPr lang="en-US" dirty="0" err="1"/>
+              <a:t>Softmax</a:t>
+            </a:r>
+            <a:r>
+              <a:rPr lang="en-US" dirty="0"/>
+              <a:t> activation as final output</a:t>
+            </a:r>
+          </a:p>
+          <a:p>
+            <a:pPr lvl="3">
+              <a:buFont typeface="Arial" panose="020B0604020202020204" pitchFamily="34" charset="0"/>
+              <a:buChar char="•"/>
+            </a:pPr>
+            <a:r>
+              <a:rPr lang="en-US" dirty="0"/>
+              <a:t>Probability that sample belongs to each class, normalized to 1</a:t>
+            </a:r>
+          </a:p>
+          <a:p>
+            <a:pPr>
+              <a:buFont typeface="Arial" panose="020B0604020202020204" pitchFamily="34" charset="0"/>
+              <a:buChar char="•"/>
+            </a:pPr>
+            <a:endParaRPr lang="en-US" dirty="0"/>
+          </a:p>
+          <a:p>
+            <a:pPr lvl="1">
+              <a:buFont typeface="Arial" panose="020B0604020202020204" pitchFamily="34" charset="0"/>
+              <a:buChar char="•"/>
+            </a:pPr>
+            <a:endParaRPr lang="en-US" dirty="0"/>
+          </a:p>
+        </p:txBody>
+      </p:sp>
+    </p:spTree>
+    <p:extLst>
+      <p:ext uri="{BB962C8B-B14F-4D97-AF65-F5344CB8AC3E}">
+        <p14:creationId xmlns:p14="http://schemas.microsoft.com/office/powerpoint/2010/main" val="1538897934"/>
+      </p:ext>
+    </p:extLst>
+  </p:cSld>
+  <p:clrMapOvr>
+    <a:masterClrMapping/>
+  </p:clrMapOvr>
+  <p:transition>
+    <p:fade thruBlk="1"/>
+  </p:transition>
+</p:sld>
+</file>
+
 <file path=ppt/slides/slide54.xml><?xml version="1.0" encoding="utf-8"?>
 <p:sld xmlns:a="http://schemas.openxmlformats.org/drawingml/2006/main" xmlns:r="http://schemas.openxmlformats.org/officeDocument/2006/relationships" xmlns:p="http://schemas.openxmlformats.org/presentationml/2006/main">
   <p:cSld>
@@ -29635,186 +29563,6 @@
             </a:pPr>
             <a:r>
               <a:rPr lang="en-US" dirty="0"/>
-              <a:t>Single </a:t>
-            </a:r>
-            <a:r>
-              <a:rPr lang="en-US" b="1" dirty="0"/>
-              <a:t>input</a:t>
-            </a:r>
-            <a:r>
-              <a:rPr lang="en-US" dirty="0"/>
-              <a:t> layer</a:t>
-            </a:r>
-          </a:p>
-          <a:p>
-            <a:pPr lvl="1">
-              <a:buFont typeface="Arial" panose="020B0604020202020204" pitchFamily="34" charset="0"/>
-              <a:buChar char="•"/>
-            </a:pPr>
-            <a:r>
-              <a:rPr lang="en-US" dirty="0"/>
-              <a:t>One neuron for each data feature</a:t>
-            </a:r>
-          </a:p>
-          <a:p>
-            <a:pPr>
-              <a:buFont typeface="Arial" panose="020B0604020202020204" pitchFamily="34" charset="0"/>
-              <a:buChar char="•"/>
-            </a:pPr>
-            <a:r>
-              <a:rPr lang="en-US" dirty="0"/>
-              <a:t>Single </a:t>
-            </a:r>
-            <a:r>
-              <a:rPr lang="en-US" b="1" dirty="0"/>
-              <a:t>output</a:t>
-            </a:r>
-            <a:r>
-              <a:rPr lang="en-US" dirty="0"/>
-              <a:t> layer</a:t>
-            </a:r>
-          </a:p>
-          <a:p>
-            <a:pPr lvl="1">
-              <a:buFont typeface="Arial" panose="020B0604020202020204" pitchFamily="34" charset="0"/>
-              <a:buChar char="•"/>
-            </a:pPr>
-            <a:r>
-              <a:rPr lang="en-US" dirty="0"/>
-              <a:t>One neuron for binary classification</a:t>
-            </a:r>
-          </a:p>
-          <a:p>
-            <a:pPr lvl="1">
-              <a:buFont typeface="Arial" panose="020B0604020202020204" pitchFamily="34" charset="0"/>
-              <a:buChar char="•"/>
-            </a:pPr>
-            <a:r>
-              <a:rPr lang="en-US" dirty="0"/>
-              <a:t>One neuron for each class in multi-class classification</a:t>
-            </a:r>
-          </a:p>
-          <a:p>
-            <a:pPr lvl="2">
-              <a:buFont typeface="Arial" panose="020B0604020202020204" pitchFamily="34" charset="0"/>
-              <a:buChar char="•"/>
-            </a:pPr>
-            <a:r>
-              <a:rPr lang="en-US" dirty="0" err="1"/>
-              <a:t>Softmax</a:t>
-            </a:r>
-            <a:r>
-              <a:rPr lang="en-US" dirty="0"/>
-              <a:t> activation as final output</a:t>
-            </a:r>
-          </a:p>
-          <a:p>
-            <a:pPr lvl="3">
-              <a:buFont typeface="Arial" panose="020B0604020202020204" pitchFamily="34" charset="0"/>
-              <a:buChar char="•"/>
-            </a:pPr>
-            <a:r>
-              <a:rPr lang="en-US" dirty="0"/>
-              <a:t>Probability that sample belongs to each class, normalized to 1</a:t>
-            </a:r>
-          </a:p>
-          <a:p>
-            <a:pPr>
-              <a:buFont typeface="Arial" panose="020B0604020202020204" pitchFamily="34" charset="0"/>
-              <a:buChar char="•"/>
-            </a:pPr>
-            <a:endParaRPr lang="en-US" dirty="0"/>
-          </a:p>
-          <a:p>
-            <a:pPr lvl="1">
-              <a:buFont typeface="Arial" panose="020B0604020202020204" pitchFamily="34" charset="0"/>
-              <a:buChar char="•"/>
-            </a:pPr>
-            <a:endParaRPr lang="en-US" dirty="0"/>
-          </a:p>
-        </p:txBody>
-      </p:sp>
-    </p:spTree>
-    <p:extLst>
-      <p:ext uri="{BB962C8B-B14F-4D97-AF65-F5344CB8AC3E}">
-        <p14:creationId xmlns:p14="http://schemas.microsoft.com/office/powerpoint/2010/main" val="1538897934"/>
-      </p:ext>
-    </p:extLst>
-  </p:cSld>
-  <p:clrMapOvr>
-    <a:masterClrMapping/>
-  </p:clrMapOvr>
-  <p:transition>
-    <p:fade thruBlk="1"/>
-  </p:transition>
-</p:sld>
-</file>
-
-<file path=ppt/slides/slide55.xml><?xml version="1.0" encoding="utf-8"?>
-<p:sld xmlns:a="http://schemas.openxmlformats.org/drawingml/2006/main" xmlns:r="http://schemas.openxmlformats.org/officeDocument/2006/relationships" xmlns:p="http://schemas.openxmlformats.org/presentationml/2006/main">
-  <p:cSld>
-    <p:spTree>
-      <p:nvGrpSpPr>
-        <p:cNvPr id="1" name=""/>
-        <p:cNvGrpSpPr/>
-        <p:nvPr/>
-      </p:nvGrpSpPr>
-      <p:grpSpPr>
-        <a:xfrm>
-          <a:off x="0" y="0"/>
-          <a:ext cx="0" cy="0"/>
-          <a:chOff x="0" y="0"/>
-          <a:chExt cx="0" cy="0"/>
-        </a:xfrm>
-      </p:grpSpPr>
-      <p:sp>
-        <p:nvSpPr>
-          <p:cNvPr id="2" name="Title 1"/>
-          <p:cNvSpPr>
-            <a:spLocks noGrp="1"/>
-          </p:cNvSpPr>
-          <p:nvPr>
-            <p:ph type="title"/>
-          </p:nvPr>
-        </p:nvSpPr>
-        <p:spPr/>
-        <p:txBody>
-          <a:bodyPr/>
-          <a:lstStyle/>
-          <a:p>
-            <a:r>
-              <a:rPr lang="en-US" dirty="0"/>
-              <a:t>Feed forward network</a:t>
-            </a:r>
-          </a:p>
-        </p:txBody>
-      </p:sp>
-      <p:sp>
-        <p:nvSpPr>
-          <p:cNvPr id="3" name="Content Placeholder 2"/>
-          <p:cNvSpPr>
-            <a:spLocks noGrp="1"/>
-          </p:cNvSpPr>
-          <p:nvPr>
-            <p:ph idx="1"/>
-          </p:nvPr>
-        </p:nvSpPr>
-        <p:spPr>
-          <a:xfrm>
-            <a:off x="457200" y="1600200"/>
-            <a:ext cx="8229600" cy="4781128"/>
-          </a:xfrm>
-        </p:spPr>
-        <p:txBody>
-          <a:bodyPr/>
-          <a:lstStyle/>
-          <a:p>
-            <a:pPr>
-              <a:buFont typeface="Arial" panose="020B0604020202020204" pitchFamily="34" charset="0"/>
-              <a:buChar char="•"/>
-            </a:pPr>
-            <a:r>
-              <a:rPr lang="en-US" dirty="0"/>
               <a:t>0 to N </a:t>
             </a:r>
             <a:r>
@@ -29928,7 +29676,7 @@
 </p:sld>
 </file>
 
-<file path=ppt/slides/slide56.xml><?xml version="1.0" encoding="utf-8"?>
+<file path=ppt/slides/slide55.xml><?xml version="1.0" encoding="utf-8"?>
 <p:sld xmlns:a="http://schemas.openxmlformats.org/drawingml/2006/main" xmlns:r="http://schemas.openxmlformats.org/officeDocument/2006/relationships" xmlns:p="http://schemas.openxmlformats.org/presentationml/2006/main">
   <p:cSld>
     <p:spTree>

</xml_diff>